<commit_message>
Edited design architecture diagram. Updated the images in PNG format. Added a version 2 of Diagrams according to TA's comments
</commit_message>
<xml_diff>
--- a/docs/diagrams/Diagrams.pptx
+++ b/docs/diagrams/Diagrams.pptx
@@ -215,7 +215,7 @@
           <a:p>
             <a:fld id="{F5CC4B3F-88C1-4FFA-B1B6-F41C21DC6924}" type="datetimeFigureOut">
               <a:rPr lang="en-US" smtClean="0"/>
-              <a:t>10/4/2016</a:t>
+              <a:t>10/7/2016</a:t>
             </a:fld>
             <a:endParaRPr lang="en-US"/>
           </a:p>
@@ -664,7 +664,7 @@
           <a:p>
             <a:fld id="{78C97017-6FC3-485B-9764-EAC9E56C1D49}" type="datetimeFigureOut">
               <a:rPr lang="en-US" smtClean="0"/>
-              <a:t>10/4/2016</a:t>
+              <a:t>10/7/2016</a:t>
             </a:fld>
             <a:endParaRPr lang="en-US"/>
           </a:p>
@@ -834,7 +834,7 @@
           <a:p>
             <a:fld id="{78C97017-6FC3-485B-9764-EAC9E56C1D49}" type="datetimeFigureOut">
               <a:rPr lang="en-US" smtClean="0"/>
-              <a:t>10/4/2016</a:t>
+              <a:t>10/7/2016</a:t>
             </a:fld>
             <a:endParaRPr lang="en-US"/>
           </a:p>
@@ -1014,7 +1014,7 @@
           <a:p>
             <a:fld id="{78C97017-6FC3-485B-9764-EAC9E56C1D49}" type="datetimeFigureOut">
               <a:rPr lang="en-US" smtClean="0"/>
-              <a:t>10/4/2016</a:t>
+              <a:t>10/7/2016</a:t>
             </a:fld>
             <a:endParaRPr lang="en-US"/>
           </a:p>
@@ -1184,7 +1184,7 @@
           <a:p>
             <a:fld id="{78C97017-6FC3-485B-9764-EAC9E56C1D49}" type="datetimeFigureOut">
               <a:rPr lang="en-US" smtClean="0"/>
-              <a:t>10/4/2016</a:t>
+              <a:t>10/7/2016</a:t>
             </a:fld>
             <a:endParaRPr lang="en-US"/>
           </a:p>
@@ -1430,7 +1430,7 @@
           <a:p>
             <a:fld id="{78C97017-6FC3-485B-9764-EAC9E56C1D49}" type="datetimeFigureOut">
               <a:rPr lang="en-US" smtClean="0"/>
-              <a:t>10/4/2016</a:t>
+              <a:t>10/7/2016</a:t>
             </a:fld>
             <a:endParaRPr lang="en-US"/>
           </a:p>
@@ -1718,7 +1718,7 @@
           <a:p>
             <a:fld id="{78C97017-6FC3-485B-9764-EAC9E56C1D49}" type="datetimeFigureOut">
               <a:rPr lang="en-US" smtClean="0"/>
-              <a:t>10/4/2016</a:t>
+              <a:t>10/7/2016</a:t>
             </a:fld>
             <a:endParaRPr lang="en-US"/>
           </a:p>
@@ -2140,7 +2140,7 @@
           <a:p>
             <a:fld id="{78C97017-6FC3-485B-9764-EAC9E56C1D49}" type="datetimeFigureOut">
               <a:rPr lang="en-US" smtClean="0"/>
-              <a:t>10/4/2016</a:t>
+              <a:t>10/7/2016</a:t>
             </a:fld>
             <a:endParaRPr lang="en-US"/>
           </a:p>
@@ -2258,7 +2258,7 @@
           <a:p>
             <a:fld id="{78C97017-6FC3-485B-9764-EAC9E56C1D49}" type="datetimeFigureOut">
               <a:rPr lang="en-US" smtClean="0"/>
-              <a:t>10/4/2016</a:t>
+              <a:t>10/7/2016</a:t>
             </a:fld>
             <a:endParaRPr lang="en-US"/>
           </a:p>
@@ -2353,7 +2353,7 @@
           <a:p>
             <a:fld id="{78C97017-6FC3-485B-9764-EAC9E56C1D49}" type="datetimeFigureOut">
               <a:rPr lang="en-US" smtClean="0"/>
-              <a:t>10/4/2016</a:t>
+              <a:t>10/7/2016</a:t>
             </a:fld>
             <a:endParaRPr lang="en-US"/>
           </a:p>
@@ -2630,7 +2630,7 @@
           <a:p>
             <a:fld id="{78C97017-6FC3-485B-9764-EAC9E56C1D49}" type="datetimeFigureOut">
               <a:rPr lang="en-US" smtClean="0"/>
-              <a:t>10/4/2016</a:t>
+              <a:t>10/7/2016</a:t>
             </a:fld>
             <a:endParaRPr lang="en-US"/>
           </a:p>
@@ -2883,7 +2883,7 @@
           <a:p>
             <a:fld id="{78C97017-6FC3-485B-9764-EAC9E56C1D49}" type="datetimeFigureOut">
               <a:rPr lang="en-US" smtClean="0"/>
-              <a:t>10/4/2016</a:t>
+              <a:t>10/7/2016</a:t>
             </a:fld>
             <a:endParaRPr lang="en-US"/>
           </a:p>
@@ -3096,7 +3096,7 @@
           <a:p>
             <a:fld id="{78C97017-6FC3-485B-9764-EAC9E56C1D49}" type="datetimeFigureOut">
               <a:rPr lang="en-US" smtClean="0"/>
-              <a:t>10/4/2016</a:t>
+              <a:t>10/7/2016</a:t>
             </a:fld>
             <a:endParaRPr lang="en-US"/>
           </a:p>
@@ -7565,8 +7565,8 @@
         </p:nvSpPr>
         <p:spPr>
           <a:xfrm>
-            <a:off x="1217465" y="1447800"/>
-            <a:ext cx="4917083" cy="4648200"/>
+            <a:off x="1219200" y="1295400"/>
+            <a:ext cx="5791200" cy="4648200"/>
           </a:xfrm>
           <a:prstGeom prst="roundRect">
             <a:avLst>
@@ -7627,7 +7627,7 @@
         </p:nvSpPr>
         <p:spPr>
           <a:xfrm>
-            <a:off x="2095948" y="2341220"/>
+            <a:off x="2289105" y="2246696"/>
             <a:ext cx="1093635" cy="346760"/>
           </a:xfrm>
           <a:prstGeom prst="rect">
@@ -7687,7 +7687,7 @@
         </p:nvSpPr>
         <p:spPr>
           <a:xfrm>
-            <a:off x="2592528" y="3179160"/>
+            <a:off x="2819399" y="3048000"/>
             <a:ext cx="1093635" cy="236841"/>
           </a:xfrm>
           <a:prstGeom prst="rect">
@@ -7747,7 +7747,7 @@
         </p:nvSpPr>
         <p:spPr>
           <a:xfrm>
-            <a:off x="2092842" y="1770924"/>
+            <a:off x="2285999" y="1600200"/>
             <a:ext cx="1093635" cy="346760"/>
           </a:xfrm>
           <a:prstGeom prst="rect">
@@ -7809,8 +7809,8 @@
         </p:nvCxnSpPr>
         <p:spPr>
           <a:xfrm rot="16200000" flipH="1">
-            <a:off x="2529445" y="2227899"/>
-            <a:ext cx="223536" cy="3106"/>
+            <a:off x="2684502" y="2095275"/>
+            <a:ext cx="299736" cy="3106"/>
           </a:xfrm>
           <a:prstGeom prst="bentConnector3">
             <a:avLst>
@@ -7849,7 +7849,7 @@
         </p:nvSpPr>
         <p:spPr>
           <a:xfrm rot="10800000" flipV="1">
-            <a:off x="5394717" y="2110477"/>
+            <a:off x="6461516" y="1958077"/>
             <a:ext cx="270504" cy="175523"/>
           </a:xfrm>
           <a:prstGeom prst="triangle">
@@ -7897,7 +7897,7 @@
         </p:nvCxnSpPr>
         <p:spPr>
           <a:xfrm flipV="1">
-            <a:off x="644735" y="2991937"/>
+            <a:off x="609599" y="2839537"/>
             <a:ext cx="684904" cy="1"/>
           </a:xfrm>
           <a:prstGeom prst="bentConnector3">
@@ -7940,7 +7940,7 @@
         </p:nvSpPr>
         <p:spPr>
           <a:xfrm rot="16200000">
-            <a:off x="5703829" y="2464877"/>
+            <a:off x="6107867" y="2312477"/>
             <a:ext cx="2362201" cy="328045"/>
           </a:xfrm>
           <a:prstGeom prst="roundRect">
@@ -8000,7 +8000,7 @@
         </p:nvSpPr>
         <p:spPr>
           <a:xfrm>
-            <a:off x="2592528" y="3649359"/>
+            <a:off x="2819399" y="3496959"/>
             <a:ext cx="1093635" cy="236841"/>
           </a:xfrm>
           <a:prstGeom prst="rect">
@@ -8060,7 +8060,7 @@
         </p:nvSpPr>
         <p:spPr>
           <a:xfrm>
-            <a:off x="2590800" y="5105400"/>
+            <a:off x="2819399" y="4953000"/>
             <a:ext cx="1093635" cy="236841"/>
           </a:xfrm>
           <a:prstGeom prst="rect">
@@ -8120,8 +8120,8 @@
         </p:nvSpPr>
         <p:spPr>
           <a:xfrm>
-            <a:off x="2592526" y="3991960"/>
-            <a:ext cx="1093635" cy="236841"/>
+            <a:off x="3809999" y="3839561"/>
+            <a:ext cx="1093635" cy="275239"/>
           </a:xfrm>
           <a:prstGeom prst="rect">
             <a:avLst/>
@@ -8180,7 +8180,7 @@
         </p:nvSpPr>
         <p:spPr>
           <a:xfrm>
-            <a:off x="3839323" y="4228801"/>
+            <a:off x="5410199" y="4038600"/>
             <a:ext cx="1040906" cy="236841"/>
           </a:xfrm>
           <a:prstGeom prst="rect">
@@ -8240,7 +8240,7 @@
         </p:nvSpPr>
         <p:spPr>
           <a:xfrm>
-            <a:off x="2590800" y="5562600"/>
+            <a:off x="2819399" y="5410200"/>
             <a:ext cx="1093635" cy="236841"/>
           </a:xfrm>
           <a:prstGeom prst="rect">
@@ -8300,7 +8300,7 @@
         </p:nvSpPr>
         <p:spPr>
           <a:xfrm>
-            <a:off x="2324548" y="2706452"/>
+            <a:off x="2517705" y="2611928"/>
             <a:ext cx="183156" cy="161573"/>
           </a:xfrm>
           <a:prstGeom prst="flowChartDecision">
@@ -8351,8 +8351,8 @@
         </p:nvCxnSpPr>
         <p:spPr>
           <a:xfrm rot="16200000" flipH="1">
-            <a:off x="2289549" y="2994602"/>
-            <a:ext cx="429556" cy="176402"/>
+            <a:off x="2517881" y="2864903"/>
+            <a:ext cx="392920" cy="210116"/>
           </a:xfrm>
           <a:prstGeom prst="bentConnector2">
             <a:avLst/>
@@ -8389,7 +8389,7 @@
         </p:nvSpPr>
         <p:spPr>
           <a:xfrm>
-            <a:off x="3759694" y="3416961"/>
+            <a:off x="4445493" y="3264561"/>
             <a:ext cx="1040906" cy="236841"/>
           </a:xfrm>
           <a:prstGeom prst="rect">
@@ -8452,8 +8452,8 @@
         </p:nvCxnSpPr>
         <p:spPr>
           <a:xfrm rot="16200000" flipH="1">
-            <a:off x="2054450" y="3229701"/>
-            <a:ext cx="899755" cy="176402"/>
+            <a:off x="2293402" y="3089382"/>
+            <a:ext cx="841879" cy="210116"/>
           </a:xfrm>
           <a:prstGeom prst="bentConnector2">
             <a:avLst/>
@@ -8487,14 +8487,14 @@
           <p:cNvPr id="47" name="Elbow Connector 63"/>
           <p:cNvCxnSpPr>
             <a:stCxn id="39" idx="2"/>
-            <a:endCxn id="36" idx="1"/>
+            <a:endCxn id="68" idx="1"/>
           </p:cNvCxnSpPr>
           <p:nvPr/>
         </p:nvCxnSpPr>
         <p:spPr>
           <a:xfrm rot="16200000" flipH="1">
-            <a:off x="1883148" y="3401003"/>
-            <a:ext cx="1242356" cy="176400"/>
+            <a:off x="2024642" y="3358142"/>
+            <a:ext cx="1379399" cy="210116"/>
           </a:xfrm>
           <a:prstGeom prst="bentConnector2">
             <a:avLst/>
@@ -8534,8 +8534,8 @@
         </p:nvCxnSpPr>
         <p:spPr>
           <a:xfrm rot="16200000" flipH="1">
-            <a:off x="1325565" y="3958586"/>
-            <a:ext cx="2355796" cy="174674"/>
+            <a:off x="1565381" y="3817403"/>
+            <a:ext cx="2297920" cy="210116"/>
           </a:xfrm>
           <a:prstGeom prst="bentConnector2">
             <a:avLst/>
@@ -8574,8 +8574,8 @@
         </p:nvCxnSpPr>
         <p:spPr>
           <a:xfrm rot="16200000" flipH="1">
-            <a:off x="893291" y="3983511"/>
-            <a:ext cx="3014019" cy="381000"/>
+            <a:off x="1133106" y="3842328"/>
+            <a:ext cx="2956144" cy="416441"/>
           </a:xfrm>
           <a:prstGeom prst="bentConnector2">
             <a:avLst/>
@@ -8612,7 +8612,7 @@
         </p:nvSpPr>
         <p:spPr>
           <a:xfrm>
-            <a:off x="5143948" y="1770924"/>
+            <a:off x="6172199" y="1600200"/>
             <a:ext cx="772043" cy="346760"/>
           </a:xfrm>
           <a:prstGeom prst="rect">
@@ -8694,8 +8694,8 @@
         </p:nvCxnSpPr>
         <p:spPr>
           <a:xfrm flipV="1">
-            <a:off x="4800600" y="2286000"/>
-            <a:ext cx="729369" cy="1249382"/>
+            <a:off x="5486399" y="2133600"/>
+            <a:ext cx="1110369" cy="1249382"/>
           </a:xfrm>
           <a:prstGeom prst="bentConnector2">
             <a:avLst/>
@@ -8735,8 +8735,8 @@
         </p:nvCxnSpPr>
         <p:spPr>
           <a:xfrm rot="5400000">
-            <a:off x="4174488" y="2991741"/>
-            <a:ext cx="2061222" cy="649740"/>
+            <a:off x="5512227" y="3072479"/>
+            <a:ext cx="2023421" cy="145663"/>
           </a:xfrm>
           <a:prstGeom prst="bentConnector2">
             <a:avLst/>
@@ -8776,8 +8776,8 @@
         </p:nvCxnSpPr>
         <p:spPr>
           <a:xfrm rot="5400000">
-            <a:off x="3867176" y="2104987"/>
-            <a:ext cx="1481780" cy="1843806"/>
+            <a:off x="4514011" y="1532623"/>
+            <a:ext cx="1481780" cy="2683734"/>
           </a:xfrm>
           <a:prstGeom prst="bentConnector2">
             <a:avLst/>
@@ -8817,8 +8817,8 @@
         </p:nvCxnSpPr>
         <p:spPr>
           <a:xfrm flipV="1">
-            <a:off x="3189583" y="2286000"/>
-            <a:ext cx="2340386" cy="228600"/>
+            <a:off x="3382740" y="2133600"/>
+            <a:ext cx="3214028" cy="286476"/>
           </a:xfrm>
           <a:prstGeom prst="bentConnector2">
             <a:avLst/>
@@ -8858,8 +8858,8 @@
         </p:nvCxnSpPr>
         <p:spPr>
           <a:xfrm rot="5400000">
-            <a:off x="3138292" y="2832143"/>
-            <a:ext cx="2937821" cy="1845534"/>
+            <a:off x="3785991" y="2260643"/>
+            <a:ext cx="2937821" cy="2683734"/>
           </a:xfrm>
           <a:prstGeom prst="bentConnector2">
             <a:avLst/>
@@ -8899,8 +8899,8 @@
         </p:nvCxnSpPr>
         <p:spPr>
           <a:xfrm rot="5400000">
-            <a:off x="2909692" y="3060743"/>
-            <a:ext cx="3395021" cy="1845534"/>
+            <a:off x="3557391" y="2489243"/>
+            <a:ext cx="3395021" cy="2683734"/>
           </a:xfrm>
           <a:prstGeom prst="bentConnector2">
             <a:avLst/>
@@ -8937,7 +8937,7 @@
         </p:nvSpPr>
         <p:spPr>
           <a:xfrm>
-            <a:off x="3657600" y="1770924"/>
+            <a:off x="4114799" y="1600200"/>
             <a:ext cx="1031399" cy="346760"/>
           </a:xfrm>
           <a:prstGeom prst="rect">
@@ -8998,8 +8998,8 @@
         </p:nvCxnSpPr>
         <p:spPr>
           <a:xfrm rot="5400000" flipH="1" flipV="1">
-            <a:off x="4594921" y="-355061"/>
-            <a:ext cx="170724" cy="4081246"/>
+            <a:off x="4921608" y="-640991"/>
+            <a:ext cx="152400" cy="4329982"/>
           </a:xfrm>
           <a:prstGeom prst="bentConnector2">
             <a:avLst/>
@@ -9032,13 +9032,16 @@
       <p:cxnSp>
         <p:nvCxnSpPr>
           <p:cNvPr id="110" name="Straight Arrow Connector 109"/>
-          <p:cNvCxnSpPr/>
+          <p:cNvCxnSpPr>
+            <a:stCxn id="9" idx="3"/>
+            <a:endCxn id="98" idx="1"/>
+          </p:cNvCxnSpPr>
           <p:nvPr/>
         </p:nvCxnSpPr>
         <p:spPr>
-          <a:xfrm flipV="1">
-            <a:off x="3198609" y="1944304"/>
-            <a:ext cx="484448" cy="2308"/>
+          <a:xfrm>
+            <a:off x="3379634" y="1773580"/>
+            <a:ext cx="735165" cy="0"/>
           </a:xfrm>
           <a:prstGeom prst="straightConnector1">
             <a:avLst/>
@@ -9071,14 +9074,15 @@
         <p:nvCxnSpPr>
           <p:cNvPr id="111" name="Straight Arrow Connector 110"/>
           <p:cNvCxnSpPr>
+            <a:stCxn id="98" idx="3"/>
             <a:endCxn id="73" idx="1"/>
           </p:cNvCxnSpPr>
           <p:nvPr/>
         </p:nvCxnSpPr>
         <p:spPr>
-          <a:xfrm flipV="1">
-            <a:off x="4714456" y="1944304"/>
-            <a:ext cx="429492" cy="2308"/>
+          <a:xfrm>
+            <a:off x="5146198" y="1773580"/>
+            <a:ext cx="1026001" cy="0"/>
           </a:xfrm>
           <a:prstGeom prst="straightConnector1">
             <a:avLst/>
@@ -9116,7 +9120,7 @@
         </p:nvSpPr>
         <p:spPr>
           <a:xfrm rot="16200000">
-            <a:off x="5947038" y="4827076"/>
+            <a:off x="6351076" y="4674676"/>
             <a:ext cx="1905001" cy="328045"/>
           </a:xfrm>
           <a:prstGeom prst="roundRect">
@@ -9176,7 +9180,7 @@
         </p:nvSpPr>
         <p:spPr>
           <a:xfrm rot="16200000">
-            <a:off x="956202" y="2861202"/>
+            <a:off x="921066" y="2708802"/>
             <a:ext cx="1093635" cy="346760"/>
           </a:xfrm>
           <a:prstGeom prst="rect">
@@ -9246,7 +9250,7 @@
         </p:nvSpPr>
         <p:spPr>
           <a:xfrm flipV="1">
-            <a:off x="1367767" y="2286001"/>
+            <a:off x="1329695" y="2133600"/>
             <a:ext cx="270504" cy="175523"/>
           </a:xfrm>
           <a:prstGeom prst="triangle">
@@ -9297,8 +9301,8 @@
         </p:nvCxnSpPr>
         <p:spPr>
           <a:xfrm rot="10800000" flipV="1">
-            <a:off x="1503020" y="1944303"/>
-            <a:ext cx="589823" cy="341697"/>
+            <a:off x="1464947" y="1773580"/>
+            <a:ext cx="821052" cy="360020"/>
           </a:xfrm>
           <a:prstGeom prst="bentConnector2">
             <a:avLst/>
@@ -9339,8 +9343,8 @@
         </p:nvCxnSpPr>
         <p:spPr>
           <a:xfrm rot="16200000" flipH="1">
-            <a:off x="3389830" y="3165517"/>
-            <a:ext cx="119381" cy="620348"/>
+            <a:off x="3856785" y="2794273"/>
+            <a:ext cx="98141" cy="1079276"/>
           </a:xfrm>
           <a:prstGeom prst="bentConnector2">
             <a:avLst/>
@@ -9380,8 +9384,8 @@
         </p:nvCxnSpPr>
         <p:spPr>
           <a:xfrm rot="5400000">
-            <a:off x="4102276" y="1869887"/>
-            <a:ext cx="1011581" cy="1843806"/>
+            <a:off x="4738491" y="1308143"/>
+            <a:ext cx="1032821" cy="2683734"/>
           </a:xfrm>
           <a:prstGeom prst="bentConnector2">
             <a:avLst/>
@@ -9421,8 +9425,8 @@
         </p:nvCxnSpPr>
         <p:spPr>
           <a:xfrm rot="16200000" flipH="1">
-            <a:off x="3430123" y="3938021"/>
-            <a:ext cx="118421" cy="699979"/>
+            <a:off x="4862398" y="3609219"/>
+            <a:ext cx="42221" cy="1053382"/>
           </a:xfrm>
           <a:prstGeom prst="bentConnector2">
             <a:avLst/>
@@ -9462,8 +9466,8 @@
         </p:nvCxnSpPr>
         <p:spPr>
           <a:xfrm rot="5400000">
-            <a:off x="3695875" y="2276286"/>
-            <a:ext cx="1824381" cy="1843808"/>
+            <a:off x="4828411" y="2208823"/>
+            <a:ext cx="1843581" cy="1693134"/>
           </a:xfrm>
           <a:prstGeom prst="bentConnector2">
             <a:avLst/>
@@ -9500,7 +9504,7 @@
         </p:nvSpPr>
         <p:spPr>
           <a:xfrm>
-            <a:off x="5435896" y="2895600"/>
+            <a:off x="6502695" y="2743200"/>
             <a:ext cx="229325" cy="166560"/>
           </a:xfrm>
           <a:prstGeom prst="rect">
@@ -9553,8 +9557,8 @@
         </p:nvSpPr>
         <p:spPr>
           <a:xfrm>
-            <a:off x="3687515" y="2981202"/>
-            <a:ext cx="3048000" cy="203200"/>
+            <a:off x="3276600" y="2819400"/>
+            <a:ext cx="3886200" cy="228600"/>
           </a:xfrm>
           <a:custGeom>
             <a:avLst/>
@@ -9635,7 +9639,7 @@
         </p:nvSpPr>
         <p:spPr>
           <a:xfrm>
-            <a:off x="5431573" y="4488138"/>
+            <a:off x="6498372" y="4335738"/>
             <a:ext cx="229325" cy="160062"/>
           </a:xfrm>
           <a:prstGeom prst="rect">
@@ -9688,8 +9692,8 @@
         </p:nvSpPr>
         <p:spPr>
           <a:xfrm flipV="1">
-            <a:off x="4114799" y="4472708"/>
-            <a:ext cx="2642195" cy="101600"/>
+            <a:off x="5943599" y="4267200"/>
+            <a:ext cx="1219200" cy="76200"/>
           </a:xfrm>
           <a:custGeom>
             <a:avLst/>
@@ -9770,8 +9774,8 @@
         </p:nvSpPr>
         <p:spPr>
           <a:xfrm>
-            <a:off x="2590800" y="4495800"/>
-            <a:ext cx="1093635" cy="236841"/>
+            <a:off x="3809999" y="4267200"/>
+            <a:ext cx="1093635" cy="304799"/>
           </a:xfrm>
           <a:prstGeom prst="rect">
             <a:avLst/>
@@ -9830,7 +9834,7 @@
         </p:nvSpPr>
         <p:spPr>
           <a:xfrm>
-            <a:off x="3837597" y="4732641"/>
+            <a:off x="5410199" y="4495800"/>
             <a:ext cx="1040906" cy="236841"/>
           </a:xfrm>
           <a:prstGeom prst="rect">
@@ -9885,13 +9889,16 @@
       <p:cxnSp>
         <p:nvCxnSpPr>
           <p:cNvPr id="56" name="Elbow Connector 55"/>
-          <p:cNvCxnSpPr/>
+          <p:cNvCxnSpPr>
+            <a:stCxn id="54" idx="2"/>
+            <a:endCxn id="55" idx="1"/>
+          </p:cNvCxnSpPr>
           <p:nvPr/>
         </p:nvCxnSpPr>
         <p:spPr>
           <a:xfrm rot="16200000" flipH="1">
-            <a:off x="3414979" y="4433621"/>
-            <a:ext cx="118421" cy="699979"/>
+            <a:off x="4862397" y="4066419"/>
+            <a:ext cx="42222" cy="1053382"/>
           </a:xfrm>
           <a:prstGeom prst="bentConnector2">
             <a:avLst/>
@@ -9928,8 +9935,8 @@
         </p:nvSpPr>
         <p:spPr>
           <a:xfrm flipV="1">
-            <a:off x="4038600" y="4953000"/>
-            <a:ext cx="2743200" cy="152400"/>
+            <a:off x="5943599" y="4724400"/>
+            <a:ext cx="1219200" cy="152400"/>
           </a:xfrm>
           <a:custGeom>
             <a:avLst/>
@@ -10002,6 +10009,189 @@
           </a:p>
         </p:txBody>
       </p:sp>
+      <p:sp>
+        <p:nvSpPr>
+          <p:cNvPr id="68" name="Rectangle 11"/>
+          <p:cNvSpPr/>
+          <p:nvPr/>
+        </p:nvSpPr>
+        <p:spPr>
+          <a:xfrm>
+            <a:off x="2819399" y="4038600"/>
+            <a:ext cx="685800" cy="228600"/>
+          </a:xfrm>
+          <a:prstGeom prst="rect">
+            <a:avLst/>
+          </a:prstGeom>
+          <a:ln w="19050">
+            <a:solidFill>
+              <a:schemeClr val="accent3"/>
+            </a:solidFill>
+          </a:ln>
+          <a:effectLst/>
+        </p:spPr>
+        <p:style>
+          <a:lnRef idx="1">
+            <a:schemeClr val="accent3"/>
+          </a:lnRef>
+          <a:fillRef idx="2">
+            <a:schemeClr val="accent3"/>
+          </a:fillRef>
+          <a:effectRef idx="1">
+            <a:schemeClr val="accent3"/>
+          </a:effectRef>
+          <a:fontRef idx="minor">
+            <a:schemeClr val="dk1"/>
+          </a:fontRef>
+        </p:style>
+        <p:txBody>
+          <a:bodyPr rtlCol="0" anchor="ctr"/>
+          <a:lstStyle/>
+          <a:p>
+            <a:pPr algn="ctr"/>
+            <a:r>
+              <a:rPr lang="en-US" sz="1050" b="1" dirty="0" err="1" smtClean="0">
+                <a:solidFill>
+                  <a:schemeClr val="accent3">
+                    <a:lumMod val="75000"/>
+                  </a:schemeClr>
+                </a:solidFill>
+              </a:rPr>
+              <a:t>ListPanel</a:t>
+            </a:r>
+            <a:endParaRPr lang="en-SG" sz="1050" b="1" dirty="0">
+              <a:solidFill>
+                <a:schemeClr val="accent3">
+                  <a:lumMod val="75000"/>
+                </a:schemeClr>
+              </a:solidFill>
+            </a:endParaRPr>
+          </a:p>
+        </p:txBody>
+      </p:sp>
+      <p:cxnSp>
+        <p:nvCxnSpPr>
+          <p:cNvPr id="81" name="Elbow Connector 63"/>
+          <p:cNvCxnSpPr>
+            <a:stCxn id="16" idx="3"/>
+            <a:endCxn id="55" idx="3"/>
+          </p:cNvCxnSpPr>
+          <p:nvPr/>
+        </p:nvCxnSpPr>
+        <p:spPr>
+          <a:xfrm rot="5400000">
+            <a:off x="5283627" y="3301079"/>
+            <a:ext cx="2480621" cy="145663"/>
+          </a:xfrm>
+          <a:prstGeom prst="bentConnector2">
+            <a:avLst/>
+          </a:prstGeom>
+          <a:ln w="6350">
+            <a:solidFill>
+              <a:schemeClr val="accent3"/>
+            </a:solidFill>
+            <a:headEnd type="none" w="med" len="med"/>
+            <a:tailEnd type="none" w="med" len="med"/>
+          </a:ln>
+          <a:effectLst/>
+        </p:spPr>
+        <p:style>
+          <a:lnRef idx="1">
+            <a:schemeClr val="accent2"/>
+          </a:lnRef>
+          <a:fillRef idx="2">
+            <a:schemeClr val="accent2"/>
+          </a:fillRef>
+          <a:effectRef idx="1">
+            <a:schemeClr val="accent2"/>
+          </a:effectRef>
+          <a:fontRef idx="minor">
+            <a:schemeClr val="dk1"/>
+          </a:fontRef>
+        </p:style>
+      </p:cxnSp>
+      <p:cxnSp>
+        <p:nvCxnSpPr>
+          <p:cNvPr id="85" name="Elbow Connector 84"/>
+          <p:cNvCxnSpPr>
+            <a:stCxn id="68" idx="3"/>
+            <a:endCxn id="54" idx="1"/>
+          </p:cNvCxnSpPr>
+          <p:nvPr/>
+        </p:nvCxnSpPr>
+        <p:spPr>
+          <a:xfrm>
+            <a:off x="3505199" y="4152900"/>
+            <a:ext cx="304800" cy="266700"/>
+          </a:xfrm>
+          <a:prstGeom prst="bentConnector3">
+            <a:avLst/>
+          </a:prstGeom>
+          <a:ln w="19050">
+            <a:solidFill>
+              <a:schemeClr val="accent3"/>
+            </a:solidFill>
+            <a:headEnd type="none" w="med" len="med"/>
+            <a:tailEnd type="arrow" w="med" len="med"/>
+          </a:ln>
+          <a:effectLst/>
+        </p:spPr>
+        <p:style>
+          <a:lnRef idx="1">
+            <a:schemeClr val="accent2"/>
+          </a:lnRef>
+          <a:fillRef idx="2">
+            <a:schemeClr val="accent2"/>
+          </a:fillRef>
+          <a:effectRef idx="1">
+            <a:schemeClr val="accent2"/>
+          </a:effectRef>
+          <a:fontRef idx="minor">
+            <a:schemeClr val="dk1"/>
+          </a:fontRef>
+        </p:style>
+      </p:cxnSp>
+      <p:cxnSp>
+        <p:nvCxnSpPr>
+          <p:cNvPr id="105" name="Elbow Connector 104"/>
+          <p:cNvCxnSpPr>
+            <a:stCxn id="68" idx="3"/>
+            <a:endCxn id="36" idx="1"/>
+          </p:cNvCxnSpPr>
+          <p:nvPr/>
+        </p:nvCxnSpPr>
+        <p:spPr>
+          <a:xfrm flipV="1">
+            <a:off x="3505199" y="3977181"/>
+            <a:ext cx="304800" cy="175719"/>
+          </a:xfrm>
+          <a:prstGeom prst="bentConnector3">
+            <a:avLst/>
+          </a:prstGeom>
+          <a:ln w="19050">
+            <a:solidFill>
+              <a:schemeClr val="accent3"/>
+            </a:solidFill>
+            <a:headEnd type="none" w="med" len="med"/>
+            <a:tailEnd type="arrow" w="med" len="med"/>
+          </a:ln>
+          <a:effectLst/>
+        </p:spPr>
+        <p:style>
+          <a:lnRef idx="1">
+            <a:schemeClr val="accent2"/>
+          </a:lnRef>
+          <a:fillRef idx="2">
+            <a:schemeClr val="accent2"/>
+          </a:fillRef>
+          <a:effectRef idx="1">
+            <a:schemeClr val="accent2"/>
+          </a:effectRef>
+          <a:fontRef idx="minor">
+            <a:schemeClr val="dk1"/>
+          </a:fontRef>
+        </p:style>
+      </p:cxnSp>
     </p:spTree>
     <p:extLst>
       <p:ext uri="{BB962C8B-B14F-4D97-AF65-F5344CB8AC3E}">
@@ -10161,62 +10351,6 @@
       </p:sp>
       <p:sp>
         <p:nvSpPr>
-          <p:cNvPr id="5" name="Rectangle 11"/>
-          <p:cNvSpPr/>
-          <p:nvPr/>
-        </p:nvSpPr>
-        <p:spPr>
-          <a:xfrm flipH="1">
-            <a:off x="5820680" y="2250968"/>
-            <a:ext cx="1186398" cy="346760"/>
-          </a:xfrm>
-          <a:prstGeom prst="rect">
-            <a:avLst/>
-          </a:prstGeom>
-          <a:ln w="19050">
-            <a:solidFill>
-              <a:srgbClr val="0070C0"/>
-            </a:solidFill>
-          </a:ln>
-          <a:effectLst/>
-        </p:spPr>
-        <p:style>
-          <a:lnRef idx="1">
-            <a:schemeClr val="accent1"/>
-          </a:lnRef>
-          <a:fillRef idx="2">
-            <a:schemeClr val="accent1"/>
-          </a:fillRef>
-          <a:effectRef idx="1">
-            <a:schemeClr val="accent1"/>
-          </a:effectRef>
-          <a:fontRef idx="minor">
-            <a:schemeClr val="dk1"/>
-          </a:fontRef>
-        </p:style>
-        <p:txBody>
-          <a:bodyPr rtlCol="0" anchor="ctr"/>
-          <a:lstStyle/>
-          <a:p>
-            <a:pPr algn="ctr"/>
-            <a:r>
-              <a:rPr lang="en-US" sz="1050" b="1" dirty="0" err="1" smtClean="0">
-                <a:solidFill>
-                  <a:srgbClr val="0070C0"/>
-                </a:solidFill>
-              </a:rPr>
-              <a:t>MarkCommand</a:t>
-            </a:r>
-            <a:endParaRPr lang="en-SG" sz="1050" b="1" dirty="0">
-              <a:solidFill>
-                <a:srgbClr val="0070C0"/>
-              </a:solidFill>
-            </a:endParaRPr>
-          </a:p>
-        </p:txBody>
-      </p:sp>
-      <p:sp>
-        <p:nvSpPr>
           <p:cNvPr id="6" name="Rectangle 62"/>
           <p:cNvSpPr/>
           <p:nvPr/>
@@ -10317,54 +10451,6 @@
           </a:fontRef>
         </p:style>
       </p:cxnSp>
-      <p:sp>
-        <p:nvSpPr>
-          <p:cNvPr id="8" name="Isosceles Triangle 102"/>
-          <p:cNvSpPr/>
-          <p:nvPr/>
-        </p:nvSpPr>
-        <p:spPr>
-          <a:xfrm rot="5400000" flipV="1">
-            <a:off x="5134110" y="2714491"/>
-            <a:ext cx="270504" cy="175523"/>
-          </a:xfrm>
-          <a:prstGeom prst="triangle">
-            <a:avLst/>
-          </a:prstGeom>
-          <a:ln w="19050">
-            <a:solidFill>
-              <a:srgbClr val="0070C0"/>
-            </a:solidFill>
-          </a:ln>
-          <a:effectLst/>
-        </p:spPr>
-        <p:style>
-          <a:lnRef idx="1">
-            <a:schemeClr val="accent1"/>
-          </a:lnRef>
-          <a:fillRef idx="2">
-            <a:schemeClr val="accent1"/>
-          </a:fillRef>
-          <a:effectRef idx="1">
-            <a:schemeClr val="accent1"/>
-          </a:effectRef>
-          <a:fontRef idx="minor">
-            <a:schemeClr val="dk1"/>
-          </a:fontRef>
-        </p:style>
-        <p:txBody>
-          <a:bodyPr rtlCol="0" anchor="ctr"/>
-          <a:lstStyle/>
-          <a:p>
-            <a:pPr algn="ctr"/>
-            <a:endParaRPr lang="en-SG" sz="1050" b="1">
-              <a:solidFill>
-                <a:srgbClr val="92D050"/>
-              </a:solidFill>
-            </a:endParaRPr>
-          </a:p>
-        </p:txBody>
-      </p:sp>
       <p:cxnSp>
         <p:nvCxnSpPr>
           <p:cNvPr id="9" name="Elbow Connector 122"/>
@@ -10470,14 +10556,14 @@
       </p:sp>
       <p:sp>
         <p:nvSpPr>
-          <p:cNvPr id="11" name="Rectangle 11"/>
+          <p:cNvPr id="14" name="Rectangle 62"/>
           <p:cNvSpPr/>
           <p:nvPr/>
         </p:nvSpPr>
         <p:spPr>
-          <a:xfrm flipH="1">
-            <a:off x="5820680" y="2657368"/>
-            <a:ext cx="1186398" cy="346760"/>
+          <a:xfrm>
+            <a:off x="4379574" y="2606161"/>
+            <a:ext cx="772043" cy="346760"/>
           </a:xfrm>
           <a:prstGeom prst="rect">
             <a:avLst/>
@@ -10509,12 +10595,27 @@
           <a:p>
             <a:pPr algn="ctr"/>
             <a:r>
-              <a:rPr lang="en-US" sz="1050" b="1" dirty="0" err="1" smtClean="0">
+              <a:rPr lang="en-US" sz="1050" b="1" dirty="0" smtClean="0">
                 <a:solidFill>
                   <a:srgbClr val="0070C0"/>
                 </a:solidFill>
               </a:rPr>
-              <a:t>SaveCommand</a:t>
+              <a:t>{abstract}</a:t>
+            </a:r>
+            <a:br>
+              <a:rPr lang="en-US" sz="1050" b="1" dirty="0" smtClean="0">
+                <a:solidFill>
+                  <a:srgbClr val="0070C0"/>
+                </a:solidFill>
+              </a:rPr>
+            </a:br>
+            <a:r>
+              <a:rPr lang="en-US" sz="1050" b="1" dirty="0" smtClean="0">
+                <a:solidFill>
+                  <a:srgbClr val="0070C0"/>
+                </a:solidFill>
+              </a:rPr>
+              <a:t>Command</a:t>
             </a:r>
             <a:endParaRPr lang="en-SG" sz="1050" b="1" dirty="0">
               <a:solidFill>
@@ -10524,262 +10625,6 @@
           </a:p>
         </p:txBody>
       </p:sp>
-      <p:sp>
-        <p:nvSpPr>
-          <p:cNvPr id="12" name="Rectangle 11"/>
-          <p:cNvSpPr/>
-          <p:nvPr/>
-        </p:nvSpPr>
-        <p:spPr>
-          <a:xfrm flipH="1">
-            <a:off x="5820678" y="3463240"/>
-            <a:ext cx="1186398" cy="346760"/>
-          </a:xfrm>
-          <a:prstGeom prst="rect">
-            <a:avLst/>
-          </a:prstGeom>
-          <a:ln w="19050">
-            <a:solidFill>
-              <a:srgbClr val="0070C0"/>
-            </a:solidFill>
-          </a:ln>
-          <a:effectLst/>
-        </p:spPr>
-        <p:style>
-          <a:lnRef idx="1">
-            <a:schemeClr val="accent1"/>
-          </a:lnRef>
-          <a:fillRef idx="2">
-            <a:schemeClr val="accent1"/>
-          </a:fillRef>
-          <a:effectRef idx="1">
-            <a:schemeClr val="accent1"/>
-          </a:effectRef>
-          <a:fontRef idx="minor">
-            <a:schemeClr val="dk1"/>
-          </a:fontRef>
-        </p:style>
-        <p:txBody>
-          <a:bodyPr rtlCol="0" anchor="ctr"/>
-          <a:lstStyle/>
-          <a:p>
-            <a:pPr algn="ctr"/>
-            <a:r>
-              <a:rPr lang="en-US" sz="1050" b="1" dirty="0" err="1" smtClean="0">
-                <a:solidFill>
-                  <a:srgbClr val="0070C0"/>
-                </a:solidFill>
-              </a:rPr>
-              <a:t>SearchCommand</a:t>
-            </a:r>
-            <a:endParaRPr lang="en-SG" sz="1050" b="1" dirty="0">
-              <a:solidFill>
-                <a:srgbClr val="0070C0"/>
-              </a:solidFill>
-            </a:endParaRPr>
-          </a:p>
-        </p:txBody>
-      </p:sp>
-      <p:sp>
-        <p:nvSpPr>
-          <p:cNvPr id="14" name="Rectangle 62"/>
-          <p:cNvSpPr/>
-          <p:nvPr/>
-        </p:nvSpPr>
-        <p:spPr>
-          <a:xfrm>
-            <a:off x="4379574" y="2606161"/>
-            <a:ext cx="772043" cy="346760"/>
-          </a:xfrm>
-          <a:prstGeom prst="rect">
-            <a:avLst/>
-          </a:prstGeom>
-          <a:ln w="19050">
-            <a:solidFill>
-              <a:srgbClr val="0070C0"/>
-            </a:solidFill>
-          </a:ln>
-          <a:effectLst/>
-        </p:spPr>
-        <p:style>
-          <a:lnRef idx="1">
-            <a:schemeClr val="accent1"/>
-          </a:lnRef>
-          <a:fillRef idx="2">
-            <a:schemeClr val="accent1"/>
-          </a:fillRef>
-          <a:effectRef idx="1">
-            <a:schemeClr val="accent1"/>
-          </a:effectRef>
-          <a:fontRef idx="minor">
-            <a:schemeClr val="dk1"/>
-          </a:fontRef>
-        </p:style>
-        <p:txBody>
-          <a:bodyPr rtlCol="0" anchor="ctr"/>
-          <a:lstStyle/>
-          <a:p>
-            <a:pPr algn="ctr"/>
-            <a:r>
-              <a:rPr lang="en-US" sz="1050" b="1" dirty="0" smtClean="0">
-                <a:solidFill>
-                  <a:srgbClr val="0070C0"/>
-                </a:solidFill>
-              </a:rPr>
-              <a:t>{abstract}</a:t>
-            </a:r>
-            <a:br>
-              <a:rPr lang="en-US" sz="1050" b="1" dirty="0" smtClean="0">
-                <a:solidFill>
-                  <a:srgbClr val="0070C0"/>
-                </a:solidFill>
-              </a:rPr>
-            </a:br>
-            <a:r>
-              <a:rPr lang="en-US" sz="1050" b="1" dirty="0" smtClean="0">
-                <a:solidFill>
-                  <a:srgbClr val="0070C0"/>
-                </a:solidFill>
-              </a:rPr>
-              <a:t>Command</a:t>
-            </a:r>
-            <a:endParaRPr lang="en-SG" sz="1050" b="1" dirty="0">
-              <a:solidFill>
-                <a:srgbClr val="0070C0"/>
-              </a:solidFill>
-            </a:endParaRPr>
-          </a:p>
-        </p:txBody>
-      </p:sp>
-      <p:cxnSp>
-        <p:nvCxnSpPr>
-          <p:cNvPr id="15" name="Elbow Connector 63"/>
-          <p:cNvCxnSpPr>
-            <a:stCxn id="5" idx="3"/>
-            <a:endCxn id="8" idx="3"/>
-          </p:cNvCxnSpPr>
-          <p:nvPr/>
-        </p:nvCxnSpPr>
-        <p:spPr>
-          <a:xfrm rot="10800000" flipV="1">
-            <a:off x="5357124" y="2424347"/>
-            <a:ext cx="463556" cy="377905"/>
-          </a:xfrm>
-          <a:prstGeom prst="bentConnector3">
-            <a:avLst>
-              <a:gd name="adj1" fmla="val 50000"/>
-            </a:avLst>
-          </a:prstGeom>
-          <a:ln w="19050">
-            <a:solidFill>
-              <a:srgbClr val="0070C0"/>
-            </a:solidFill>
-            <a:headEnd type="none" w="med" len="med"/>
-            <a:tailEnd type="none" w="med" len="med"/>
-          </a:ln>
-          <a:effectLst/>
-        </p:spPr>
-        <p:style>
-          <a:lnRef idx="1">
-            <a:schemeClr val="accent2"/>
-          </a:lnRef>
-          <a:fillRef idx="2">
-            <a:schemeClr val="accent2"/>
-          </a:fillRef>
-          <a:effectRef idx="1">
-            <a:schemeClr val="accent2"/>
-          </a:effectRef>
-          <a:fontRef idx="minor">
-            <a:schemeClr val="dk1"/>
-          </a:fontRef>
-        </p:style>
-      </p:cxnSp>
-      <p:cxnSp>
-        <p:nvCxnSpPr>
-          <p:cNvPr id="16" name="Elbow Connector 63"/>
-          <p:cNvCxnSpPr>
-            <a:stCxn id="8" idx="3"/>
-            <a:endCxn id="12" idx="3"/>
-          </p:cNvCxnSpPr>
-          <p:nvPr/>
-        </p:nvCxnSpPr>
-        <p:spPr>
-          <a:xfrm>
-            <a:off x="5357124" y="2802253"/>
-            <a:ext cx="463554" cy="834367"/>
-          </a:xfrm>
-          <a:prstGeom prst="bentConnector3">
-            <a:avLst>
-              <a:gd name="adj1" fmla="val 50000"/>
-            </a:avLst>
-          </a:prstGeom>
-          <a:ln w="19050">
-            <a:solidFill>
-              <a:srgbClr val="0070C0"/>
-            </a:solidFill>
-            <a:headEnd type="none" w="med" len="med"/>
-            <a:tailEnd type="none" w="med" len="med"/>
-          </a:ln>
-          <a:effectLst/>
-        </p:spPr>
-        <p:style>
-          <a:lnRef idx="1">
-            <a:schemeClr val="accent2"/>
-          </a:lnRef>
-          <a:fillRef idx="2">
-            <a:schemeClr val="accent2"/>
-          </a:fillRef>
-          <a:effectRef idx="1">
-            <a:schemeClr val="accent2"/>
-          </a:effectRef>
-          <a:fontRef idx="minor">
-            <a:schemeClr val="dk1"/>
-          </a:fontRef>
-        </p:style>
-      </p:cxnSp>
-      <p:cxnSp>
-        <p:nvCxnSpPr>
-          <p:cNvPr id="17" name="Elbow Connector 63"/>
-          <p:cNvCxnSpPr>
-            <a:stCxn id="8" idx="3"/>
-            <a:endCxn id="11" idx="3"/>
-          </p:cNvCxnSpPr>
-          <p:nvPr/>
-        </p:nvCxnSpPr>
-        <p:spPr>
-          <a:xfrm>
-            <a:off x="5357124" y="2802253"/>
-            <a:ext cx="463556" cy="28495"/>
-          </a:xfrm>
-          <a:prstGeom prst="bentConnector3">
-            <a:avLst>
-              <a:gd name="adj1" fmla="val 50000"/>
-            </a:avLst>
-          </a:prstGeom>
-          <a:ln w="19050">
-            <a:solidFill>
-              <a:srgbClr val="0070C0"/>
-            </a:solidFill>
-            <a:headEnd type="none" w="med" len="med"/>
-            <a:tailEnd type="none" w="med" len="med"/>
-          </a:ln>
-          <a:effectLst/>
-        </p:spPr>
-        <p:style>
-          <a:lnRef idx="1">
-            <a:schemeClr val="accent2"/>
-          </a:lnRef>
-          <a:fillRef idx="2">
-            <a:schemeClr val="accent2"/>
-          </a:fillRef>
-          <a:effectRef idx="1">
-            <a:schemeClr val="accent2"/>
-          </a:effectRef>
-          <a:fontRef idx="minor">
-            <a:schemeClr val="dk1"/>
-          </a:fontRef>
-        </p:style>
-      </p:cxnSp>
       <p:sp>
         <p:nvSpPr>
           <p:cNvPr id="18" name="Rectangle 62"/>
@@ -11646,13 +11491,13 @@
       </p:grpSp>
       <p:sp>
         <p:nvSpPr>
-          <p:cNvPr id="44" name="Rectangle 11"/>
+          <p:cNvPr id="144" name="Rectangle 11"/>
           <p:cNvSpPr/>
           <p:nvPr/>
         </p:nvSpPr>
         <p:spPr>
           <a:xfrm flipH="1">
-            <a:off x="5825478" y="3060538"/>
+            <a:off x="1970602" y="4419600"/>
             <a:ext cx="1186398" cy="346760"/>
           </a:xfrm>
           <a:prstGeom prst="rect">
@@ -11690,7 +11535,7 @@
                   <a:srgbClr val="0070C0"/>
                 </a:solidFill>
               </a:rPr>
-              <a:t>DeleteCommand</a:t>
+              <a:t>EditTaskParser</a:t>
             </a:r>
             <a:endParaRPr lang="en-SG" sz="1050" b="1" dirty="0">
               <a:solidFill>
@@ -11700,67 +11545,24 @@
           </a:p>
         </p:txBody>
       </p:sp>
-      <p:cxnSp>
-        <p:nvCxnSpPr>
-          <p:cNvPr id="45" name="Elbow Connector 63"/>
-          <p:cNvCxnSpPr>
-            <a:stCxn id="8" idx="3"/>
-            <a:endCxn id="44" idx="3"/>
-          </p:cNvCxnSpPr>
-          <p:nvPr/>
-        </p:nvCxnSpPr>
-        <p:spPr>
-          <a:xfrm>
-            <a:off x="5357124" y="2802253"/>
-            <a:ext cx="468354" cy="431665"/>
-          </a:xfrm>
-          <a:prstGeom prst="bentConnector3">
-            <a:avLst>
-              <a:gd name="adj1" fmla="val 50000"/>
-            </a:avLst>
+      <p:sp>
+        <p:nvSpPr>
+          <p:cNvPr id="145" name="Rectangle 11"/>
+          <p:cNvSpPr/>
+          <p:nvPr/>
+        </p:nvSpPr>
+        <p:spPr>
+          <a:xfrm flipH="1">
+            <a:off x="1967281" y="4003568"/>
+            <a:ext cx="1186398" cy="346760"/>
+          </a:xfrm>
+          <a:prstGeom prst="rect">
+            <a:avLst/>
           </a:prstGeom>
           <a:ln w="19050">
             <a:solidFill>
               <a:srgbClr val="0070C0"/>
             </a:solidFill>
-            <a:headEnd type="none" w="med" len="med"/>
-            <a:tailEnd type="none" w="med" len="med"/>
-          </a:ln>
-          <a:effectLst/>
-        </p:spPr>
-        <p:style>
-          <a:lnRef idx="1">
-            <a:schemeClr val="accent2"/>
-          </a:lnRef>
-          <a:fillRef idx="2">
-            <a:schemeClr val="accent2"/>
-          </a:fillRef>
-          <a:effectRef idx="1">
-            <a:schemeClr val="accent2"/>
-          </a:effectRef>
-          <a:fontRef idx="minor">
-            <a:schemeClr val="dk1"/>
-          </a:fontRef>
-        </p:style>
-      </p:cxnSp>
-      <p:sp>
-        <p:nvSpPr>
-          <p:cNvPr id="46" name="Rectangle 11"/>
-          <p:cNvSpPr/>
-          <p:nvPr/>
-        </p:nvSpPr>
-        <p:spPr>
-          <a:xfrm flipH="1">
-            <a:off x="5824001" y="1828800"/>
-            <a:ext cx="1186398" cy="346760"/>
-          </a:xfrm>
-          <a:prstGeom prst="rect">
-            <a:avLst/>
-          </a:prstGeom>
-          <a:ln w="19050">
-            <a:solidFill>
-              <a:srgbClr val="0070C0"/>
-            </a:solidFill>
           </a:ln>
           <a:effectLst/>
         </p:spPr>
@@ -11789,7 +11591,7 @@
                   <a:srgbClr val="0070C0"/>
                 </a:solidFill>
               </a:rPr>
-              <a:t>EditCommand</a:t>
+              <a:t>AddEventParser</a:t>
             </a:r>
             <a:endParaRPr lang="en-SG" sz="1050" b="1" dirty="0">
               <a:solidFill>
@@ -11801,13 +11603,13 @@
       </p:sp>
       <p:sp>
         <p:nvSpPr>
-          <p:cNvPr id="47" name="Rectangle 11"/>
+          <p:cNvPr id="146" name="Rectangle 11"/>
           <p:cNvSpPr/>
           <p:nvPr/>
         </p:nvSpPr>
         <p:spPr>
           <a:xfrm flipH="1">
-            <a:off x="5820680" y="1412768"/>
+            <a:off x="1970602" y="3581400"/>
             <a:ext cx="1186398" cy="346760"/>
           </a:xfrm>
           <a:prstGeom prst="rect">
@@ -11845,7 +11647,7 @@
                   <a:srgbClr val="0070C0"/>
                 </a:solidFill>
               </a:rPr>
-              <a:t>HelpCommand</a:t>
+              <a:t>AddTaskParser</a:t>
             </a:r>
             <a:endParaRPr lang="en-SG" sz="1050" b="1" dirty="0">
               <a:solidFill>
@@ -11855,2026 +11657,6 @@
           </a:p>
         </p:txBody>
       </p:sp>
-      <p:sp>
-        <p:nvSpPr>
-          <p:cNvPr id="48" name="Rectangle 11"/>
-          <p:cNvSpPr/>
-          <p:nvPr/>
-        </p:nvSpPr>
-        <p:spPr>
-          <a:xfrm flipH="1">
-            <a:off x="5824001" y="990600"/>
-            <a:ext cx="1186398" cy="346760"/>
-          </a:xfrm>
-          <a:prstGeom prst="rect">
-            <a:avLst/>
-          </a:prstGeom>
-          <a:ln w="19050">
-            <a:solidFill>
-              <a:srgbClr val="0070C0"/>
-            </a:solidFill>
-          </a:ln>
-          <a:effectLst/>
-        </p:spPr>
-        <p:style>
-          <a:lnRef idx="1">
-            <a:schemeClr val="accent1"/>
-          </a:lnRef>
-          <a:fillRef idx="2">
-            <a:schemeClr val="accent1"/>
-          </a:fillRef>
-          <a:effectRef idx="1">
-            <a:schemeClr val="accent1"/>
-          </a:effectRef>
-          <a:fontRef idx="minor">
-            <a:schemeClr val="dk1"/>
-          </a:fontRef>
-        </p:style>
-        <p:txBody>
-          <a:bodyPr rtlCol="0" anchor="ctr"/>
-          <a:lstStyle/>
-          <a:p>
-            <a:pPr algn="ctr"/>
-            <a:r>
-              <a:rPr lang="en-US" sz="1050" b="1" dirty="0" err="1">
-                <a:solidFill>
-                  <a:srgbClr val="0070C0"/>
-                </a:solidFill>
-              </a:rPr>
-              <a:t>AddCommand</a:t>
-            </a:r>
-            <a:endParaRPr lang="en-SG" sz="1050" b="1" dirty="0">
-              <a:solidFill>
-                <a:srgbClr val="0070C0"/>
-              </a:solidFill>
-            </a:endParaRPr>
-          </a:p>
-        </p:txBody>
-      </p:sp>
-      <p:sp>
-        <p:nvSpPr>
-          <p:cNvPr id="49" name="Rectangle 48"/>
-          <p:cNvSpPr/>
-          <p:nvPr/>
-        </p:nvSpPr>
-        <p:spPr>
-          <a:xfrm flipH="1">
-            <a:off x="5819201" y="4288902"/>
-            <a:ext cx="1186398" cy="346760"/>
-          </a:xfrm>
-          <a:prstGeom prst="rect">
-            <a:avLst/>
-          </a:prstGeom>
-          <a:ln w="19050">
-            <a:solidFill>
-              <a:srgbClr val="0070C0"/>
-            </a:solidFill>
-          </a:ln>
-          <a:effectLst/>
-        </p:spPr>
-        <p:style>
-          <a:lnRef idx="1">
-            <a:schemeClr val="accent1"/>
-          </a:lnRef>
-          <a:fillRef idx="2">
-            <a:schemeClr val="accent1"/>
-          </a:fillRef>
-          <a:effectRef idx="1">
-            <a:schemeClr val="accent1"/>
-          </a:effectRef>
-          <a:fontRef idx="minor">
-            <a:schemeClr val="dk1"/>
-          </a:fontRef>
-        </p:style>
-        <p:txBody>
-          <a:bodyPr rtlCol="0" anchor="ctr"/>
-          <a:lstStyle/>
-          <a:p>
-            <a:pPr algn="ctr"/>
-            <a:r>
-              <a:rPr lang="en-US" sz="1050" b="1" dirty="0" err="1" smtClean="0">
-                <a:solidFill>
-                  <a:srgbClr val="0070C0"/>
-                </a:solidFill>
-              </a:rPr>
-              <a:t>ListCommand</a:t>
-            </a:r>
-            <a:endParaRPr lang="en-SG" sz="1050" b="1" dirty="0">
-              <a:solidFill>
-                <a:srgbClr val="0070C0"/>
-              </a:solidFill>
-            </a:endParaRPr>
-          </a:p>
-        </p:txBody>
-      </p:sp>
-      <p:sp>
-        <p:nvSpPr>
-          <p:cNvPr id="50" name="Rectangle 11"/>
-          <p:cNvSpPr/>
-          <p:nvPr/>
-        </p:nvSpPr>
-        <p:spPr>
-          <a:xfrm flipH="1">
-            <a:off x="5824001" y="3886200"/>
-            <a:ext cx="1186398" cy="346760"/>
-          </a:xfrm>
-          <a:prstGeom prst="rect">
-            <a:avLst/>
-          </a:prstGeom>
-          <a:ln w="19050">
-            <a:solidFill>
-              <a:srgbClr val="0070C0"/>
-            </a:solidFill>
-          </a:ln>
-          <a:effectLst/>
-        </p:spPr>
-        <p:style>
-          <a:lnRef idx="1">
-            <a:schemeClr val="accent1"/>
-          </a:lnRef>
-          <a:fillRef idx="2">
-            <a:schemeClr val="accent1"/>
-          </a:fillRef>
-          <a:effectRef idx="1">
-            <a:schemeClr val="accent1"/>
-          </a:effectRef>
-          <a:fontRef idx="minor">
-            <a:schemeClr val="dk1"/>
-          </a:fontRef>
-        </p:style>
-        <p:txBody>
-          <a:bodyPr rtlCol="0" anchor="ctr"/>
-          <a:lstStyle/>
-          <a:p>
-            <a:pPr algn="ctr"/>
-            <a:r>
-              <a:rPr lang="en-US" sz="1050" b="1" dirty="0" err="1" smtClean="0">
-                <a:solidFill>
-                  <a:srgbClr val="0070C0"/>
-                </a:solidFill>
-              </a:rPr>
-              <a:t>UndoCommand</a:t>
-            </a:r>
-            <a:endParaRPr lang="en-SG" sz="1050" b="1" dirty="0">
-              <a:solidFill>
-                <a:srgbClr val="0070C0"/>
-              </a:solidFill>
-            </a:endParaRPr>
-          </a:p>
-        </p:txBody>
-      </p:sp>
-      <p:cxnSp>
-        <p:nvCxnSpPr>
-          <p:cNvPr id="31" name="Elbow Connector 30"/>
-          <p:cNvCxnSpPr>
-            <a:stCxn id="48" idx="3"/>
-            <a:endCxn id="8" idx="3"/>
-          </p:cNvCxnSpPr>
-          <p:nvPr/>
-        </p:nvCxnSpPr>
-        <p:spPr>
-          <a:xfrm rot="10800000" flipV="1">
-            <a:off x="5357125" y="1163979"/>
-            <a:ext cx="466877" cy="1638273"/>
-          </a:xfrm>
-          <a:prstGeom prst="bentConnector3">
-            <a:avLst>
-              <a:gd name="adj1" fmla="val 50000"/>
-            </a:avLst>
-          </a:prstGeom>
-          <a:ln w="19050">
-            <a:solidFill>
-              <a:srgbClr val="0070C0"/>
-            </a:solidFill>
-            <a:headEnd type="none" w="med" len="med"/>
-            <a:tailEnd type="none" w="med" len="med"/>
-          </a:ln>
-          <a:effectLst/>
-        </p:spPr>
-        <p:style>
-          <a:lnRef idx="1">
-            <a:schemeClr val="accent2"/>
-          </a:lnRef>
-          <a:fillRef idx="2">
-            <a:schemeClr val="accent2"/>
-          </a:fillRef>
-          <a:effectRef idx="1">
-            <a:schemeClr val="accent2"/>
-          </a:effectRef>
-          <a:fontRef idx="minor">
-            <a:schemeClr val="dk1"/>
-          </a:fontRef>
-        </p:style>
-      </p:cxnSp>
-      <p:sp>
-        <p:nvSpPr>
-          <p:cNvPr id="64" name="Rectangle 63"/>
-          <p:cNvSpPr/>
-          <p:nvPr/>
-        </p:nvSpPr>
-        <p:spPr>
-          <a:xfrm flipH="1">
-            <a:off x="5824002" y="4682440"/>
-            <a:ext cx="1186398" cy="346760"/>
-          </a:xfrm>
-          <a:prstGeom prst="rect">
-            <a:avLst/>
-          </a:prstGeom>
-          <a:ln w="19050">
-            <a:solidFill>
-              <a:srgbClr val="0070C0"/>
-            </a:solidFill>
-          </a:ln>
-          <a:effectLst/>
-        </p:spPr>
-        <p:style>
-          <a:lnRef idx="1">
-            <a:schemeClr val="accent1"/>
-          </a:lnRef>
-          <a:fillRef idx="2">
-            <a:schemeClr val="accent1"/>
-          </a:fillRef>
-          <a:effectRef idx="1">
-            <a:schemeClr val="accent1"/>
-          </a:effectRef>
-          <a:fontRef idx="minor">
-            <a:schemeClr val="dk1"/>
-          </a:fontRef>
-        </p:style>
-        <p:txBody>
-          <a:bodyPr rtlCol="0" anchor="ctr"/>
-          <a:lstStyle/>
-          <a:p>
-            <a:pPr algn="ctr"/>
-            <a:r>
-              <a:rPr lang="en-US" sz="1050" b="1" dirty="0" err="1" smtClean="0">
-                <a:solidFill>
-                  <a:srgbClr val="0070C0"/>
-                </a:solidFill>
-              </a:rPr>
-              <a:t>ExitCommand</a:t>
-            </a:r>
-            <a:endParaRPr lang="en-SG" sz="1050" b="1" dirty="0">
-              <a:solidFill>
-                <a:srgbClr val="0070C0"/>
-              </a:solidFill>
-            </a:endParaRPr>
-          </a:p>
-        </p:txBody>
-      </p:sp>
-      <p:cxnSp>
-        <p:nvCxnSpPr>
-          <p:cNvPr id="66" name="Elbow Connector 65"/>
-          <p:cNvCxnSpPr>
-            <a:stCxn id="8" idx="3"/>
-            <a:endCxn id="64" idx="3"/>
-          </p:cNvCxnSpPr>
-          <p:nvPr/>
-        </p:nvCxnSpPr>
-        <p:spPr>
-          <a:xfrm>
-            <a:off x="5357124" y="2802253"/>
-            <a:ext cx="466878" cy="2053567"/>
-          </a:xfrm>
-          <a:prstGeom prst="bentConnector3">
-            <a:avLst>
-              <a:gd name="adj1" fmla="val 50000"/>
-            </a:avLst>
-          </a:prstGeom>
-          <a:ln w="19050">
-            <a:solidFill>
-              <a:srgbClr val="0070C0"/>
-            </a:solidFill>
-            <a:headEnd type="none" w="med" len="med"/>
-            <a:tailEnd type="none" w="med" len="med"/>
-          </a:ln>
-          <a:effectLst/>
-        </p:spPr>
-        <p:style>
-          <a:lnRef idx="1">
-            <a:schemeClr val="accent2"/>
-          </a:lnRef>
-          <a:fillRef idx="2">
-            <a:schemeClr val="accent2"/>
-          </a:fillRef>
-          <a:effectRef idx="1">
-            <a:schemeClr val="accent2"/>
-          </a:effectRef>
-          <a:fontRef idx="minor">
-            <a:schemeClr val="dk1"/>
-          </a:fontRef>
-        </p:style>
-      </p:cxnSp>
-      <p:cxnSp>
-        <p:nvCxnSpPr>
-          <p:cNvPr id="69" name="Elbow Connector 68"/>
-          <p:cNvCxnSpPr>
-            <a:stCxn id="8" idx="3"/>
-            <a:endCxn id="47" idx="3"/>
-          </p:cNvCxnSpPr>
-          <p:nvPr/>
-        </p:nvCxnSpPr>
-        <p:spPr>
-          <a:xfrm flipV="1">
-            <a:off x="5357124" y="1586148"/>
-            <a:ext cx="463556" cy="1216105"/>
-          </a:xfrm>
-          <a:prstGeom prst="bentConnector3">
-            <a:avLst/>
-          </a:prstGeom>
-          <a:ln w="19050">
-            <a:solidFill>
-              <a:srgbClr val="0070C0"/>
-            </a:solidFill>
-            <a:headEnd type="none" w="med" len="med"/>
-            <a:tailEnd type="none" w="med" len="med"/>
-          </a:ln>
-          <a:effectLst/>
-        </p:spPr>
-        <p:style>
-          <a:lnRef idx="1">
-            <a:schemeClr val="accent2"/>
-          </a:lnRef>
-          <a:fillRef idx="2">
-            <a:schemeClr val="accent2"/>
-          </a:fillRef>
-          <a:effectRef idx="1">
-            <a:schemeClr val="accent2"/>
-          </a:effectRef>
-          <a:fontRef idx="minor">
-            <a:schemeClr val="dk1"/>
-          </a:fontRef>
-        </p:style>
-      </p:cxnSp>
-      <p:cxnSp>
-        <p:nvCxnSpPr>
-          <p:cNvPr id="71" name="Elbow Connector 70"/>
-          <p:cNvCxnSpPr>
-            <a:stCxn id="8" idx="3"/>
-            <a:endCxn id="46" idx="3"/>
-          </p:cNvCxnSpPr>
-          <p:nvPr/>
-        </p:nvCxnSpPr>
-        <p:spPr>
-          <a:xfrm flipV="1">
-            <a:off x="5357124" y="2002180"/>
-            <a:ext cx="466877" cy="800073"/>
-          </a:xfrm>
-          <a:prstGeom prst="bentConnector3">
-            <a:avLst>
-              <a:gd name="adj1" fmla="val 50000"/>
-            </a:avLst>
-          </a:prstGeom>
-          <a:ln w="19050">
-            <a:solidFill>
-              <a:srgbClr val="0070C0"/>
-            </a:solidFill>
-            <a:headEnd type="none" w="med" len="med"/>
-            <a:tailEnd type="none" w="med" len="med"/>
-          </a:ln>
-          <a:effectLst/>
-        </p:spPr>
-        <p:style>
-          <a:lnRef idx="1">
-            <a:schemeClr val="accent2"/>
-          </a:lnRef>
-          <a:fillRef idx="2">
-            <a:schemeClr val="accent2"/>
-          </a:fillRef>
-          <a:effectRef idx="1">
-            <a:schemeClr val="accent2"/>
-          </a:effectRef>
-          <a:fontRef idx="minor">
-            <a:schemeClr val="dk1"/>
-          </a:fontRef>
-        </p:style>
-      </p:cxnSp>
-      <p:cxnSp>
-        <p:nvCxnSpPr>
-          <p:cNvPr id="74" name="Elbow Connector 73"/>
-          <p:cNvCxnSpPr>
-            <a:stCxn id="8" idx="3"/>
-            <a:endCxn id="49" idx="3"/>
-          </p:cNvCxnSpPr>
-          <p:nvPr/>
-        </p:nvCxnSpPr>
-        <p:spPr>
-          <a:xfrm>
-            <a:off x="5357124" y="2802253"/>
-            <a:ext cx="462077" cy="1660029"/>
-          </a:xfrm>
-          <a:prstGeom prst="bentConnector3">
-            <a:avLst/>
-          </a:prstGeom>
-          <a:ln w="19050">
-            <a:solidFill>
-              <a:srgbClr val="0070C0"/>
-            </a:solidFill>
-            <a:headEnd type="none" w="med" len="med"/>
-            <a:tailEnd type="none" w="med" len="med"/>
-          </a:ln>
-          <a:effectLst/>
-        </p:spPr>
-        <p:style>
-          <a:lnRef idx="1">
-            <a:schemeClr val="accent2"/>
-          </a:lnRef>
-          <a:fillRef idx="2">
-            <a:schemeClr val="accent2"/>
-          </a:fillRef>
-          <a:effectRef idx="1">
-            <a:schemeClr val="accent2"/>
-          </a:effectRef>
-          <a:fontRef idx="minor">
-            <a:schemeClr val="dk1"/>
-          </a:fontRef>
-        </p:style>
-      </p:cxnSp>
-      <p:cxnSp>
-        <p:nvCxnSpPr>
-          <p:cNvPr id="76" name="Elbow Connector 75"/>
-          <p:cNvCxnSpPr>
-            <a:stCxn id="50" idx="3"/>
-            <a:endCxn id="8" idx="3"/>
-          </p:cNvCxnSpPr>
-          <p:nvPr/>
-        </p:nvCxnSpPr>
-        <p:spPr>
-          <a:xfrm rot="10800000">
-            <a:off x="5357125" y="2802254"/>
-            <a:ext cx="466877" cy="1257327"/>
-          </a:xfrm>
-          <a:prstGeom prst="bentConnector3">
-            <a:avLst>
-              <a:gd name="adj1" fmla="val 50000"/>
-            </a:avLst>
-          </a:prstGeom>
-          <a:ln w="19050">
-            <a:solidFill>
-              <a:srgbClr val="0070C0"/>
-            </a:solidFill>
-            <a:headEnd type="none" w="med" len="med"/>
-            <a:tailEnd type="none" w="med" len="med"/>
-          </a:ln>
-          <a:effectLst/>
-        </p:spPr>
-        <p:style>
-          <a:lnRef idx="1">
-            <a:schemeClr val="accent2"/>
-          </a:lnRef>
-          <a:fillRef idx="2">
-            <a:schemeClr val="accent2"/>
-          </a:fillRef>
-          <a:effectRef idx="1">
-            <a:schemeClr val="accent2"/>
-          </a:effectRef>
-          <a:fontRef idx="minor">
-            <a:schemeClr val="dk1"/>
-          </a:fontRef>
-        </p:style>
-      </p:cxnSp>
-      <p:grpSp>
-        <p:nvGrpSpPr>
-          <p:cNvPr id="88" name="Group 87"/>
-          <p:cNvGrpSpPr/>
-          <p:nvPr/>
-        </p:nvGrpSpPr>
-        <p:grpSpPr>
-          <a:xfrm>
-            <a:off x="7010399" y="762000"/>
-            <a:ext cx="1414999" cy="803960"/>
-            <a:chOff x="7010399" y="762000"/>
-            <a:chExt cx="1414999" cy="803960"/>
-          </a:xfrm>
-          <a:solidFill>
-            <a:schemeClr val="tx2">
-              <a:lumMod val="20000"/>
-              <a:lumOff val="80000"/>
-            </a:schemeClr>
-          </a:solidFill>
-        </p:grpSpPr>
-        <p:sp>
-          <p:nvSpPr>
-            <p:cNvPr id="78" name="Rectangle 11"/>
-            <p:cNvSpPr/>
-            <p:nvPr/>
-          </p:nvSpPr>
-          <p:spPr>
-            <a:xfrm flipH="1">
-              <a:off x="7239000" y="762000"/>
-              <a:ext cx="1186398" cy="346760"/>
-            </a:xfrm>
-            <a:prstGeom prst="rect">
-              <a:avLst/>
-            </a:prstGeom>
-            <a:grpFill/>
-            <a:ln w="19050">
-              <a:solidFill>
-                <a:srgbClr val="0070C0"/>
-              </a:solidFill>
-              <a:headEnd type="none" w="med" len="med"/>
-              <a:tailEnd type="none" w="med" len="med"/>
-            </a:ln>
-            <a:effectLst/>
-          </p:spPr>
-          <p:style>
-            <a:lnRef idx="1">
-              <a:schemeClr val="accent2"/>
-            </a:lnRef>
-            <a:fillRef idx="2">
-              <a:schemeClr val="accent2"/>
-            </a:fillRef>
-            <a:effectRef idx="1">
-              <a:schemeClr val="accent2"/>
-            </a:effectRef>
-            <a:fontRef idx="minor">
-              <a:schemeClr val="dk1"/>
-            </a:fontRef>
-          </p:style>
-          <p:txBody>
-            <a:bodyPr rtlCol="0" anchor="ctr"/>
-            <a:lstStyle/>
-            <a:p>
-              <a:pPr algn="ctr"/>
-              <a:r>
-                <a:rPr lang="en-US" sz="950" b="1" dirty="0" err="1" smtClean="0">
-                  <a:solidFill>
-                    <a:srgbClr val="0070C0"/>
-                  </a:solidFill>
-                </a:rPr>
-                <a:t>AddTaskCommand</a:t>
-              </a:r>
-              <a:endParaRPr lang="en-SG" sz="950" b="1" dirty="0">
-                <a:solidFill>
-                  <a:srgbClr val="0070C0"/>
-                </a:solidFill>
-              </a:endParaRPr>
-            </a:p>
-          </p:txBody>
-        </p:sp>
-        <p:sp>
-          <p:nvSpPr>
-            <p:cNvPr id="79" name="Rectangle 11"/>
-            <p:cNvSpPr/>
-            <p:nvPr/>
-          </p:nvSpPr>
-          <p:spPr>
-            <a:xfrm flipH="1">
-              <a:off x="7239000" y="1219200"/>
-              <a:ext cx="1186398" cy="346760"/>
-            </a:xfrm>
-            <a:prstGeom prst="rect">
-              <a:avLst/>
-            </a:prstGeom>
-            <a:grpFill/>
-            <a:ln w="19050">
-              <a:solidFill>
-                <a:srgbClr val="0070C0"/>
-              </a:solidFill>
-              <a:headEnd type="none" w="med" len="med"/>
-              <a:tailEnd type="none" w="med" len="med"/>
-            </a:ln>
-            <a:effectLst/>
-          </p:spPr>
-          <p:style>
-            <a:lnRef idx="1">
-              <a:schemeClr val="accent2"/>
-            </a:lnRef>
-            <a:fillRef idx="2">
-              <a:schemeClr val="accent2"/>
-            </a:fillRef>
-            <a:effectRef idx="1">
-              <a:schemeClr val="accent2"/>
-            </a:effectRef>
-            <a:fontRef idx="minor">
-              <a:schemeClr val="dk1"/>
-            </a:fontRef>
-          </p:style>
-          <p:txBody>
-            <a:bodyPr rtlCol="0" anchor="ctr"/>
-            <a:lstStyle/>
-            <a:p>
-              <a:pPr algn="ctr"/>
-              <a:r>
-                <a:rPr lang="en-US" sz="950" b="1" dirty="0" err="1" smtClean="0">
-                  <a:solidFill>
-                    <a:srgbClr val="0070C0"/>
-                  </a:solidFill>
-                </a:rPr>
-                <a:t>AddEventCommand</a:t>
-              </a:r>
-              <a:endParaRPr lang="en-SG" sz="950" b="1" dirty="0">
-                <a:solidFill>
-                  <a:srgbClr val="0070C0"/>
-                </a:solidFill>
-              </a:endParaRPr>
-            </a:p>
-          </p:txBody>
-        </p:sp>
-        <p:cxnSp>
-          <p:nvCxnSpPr>
-            <p:cNvPr id="81" name="Elbow Connector 80"/>
-            <p:cNvCxnSpPr>
-              <a:stCxn id="48" idx="1"/>
-              <a:endCxn id="78" idx="3"/>
-            </p:cNvCxnSpPr>
-            <p:nvPr/>
-          </p:nvCxnSpPr>
-          <p:spPr>
-            <a:xfrm flipV="1">
-              <a:off x="7010399" y="935380"/>
-              <a:ext cx="228601" cy="228600"/>
-            </a:xfrm>
-            <a:prstGeom prst="bentConnector3">
-              <a:avLst/>
-            </a:prstGeom>
-            <a:grpFill/>
-            <a:ln w="19050">
-              <a:solidFill>
-                <a:srgbClr val="0070C0"/>
-              </a:solidFill>
-              <a:headEnd type="none" w="med" len="med"/>
-              <a:tailEnd type="none" w="med" len="med"/>
-            </a:ln>
-            <a:effectLst/>
-          </p:spPr>
-          <p:style>
-            <a:lnRef idx="1">
-              <a:schemeClr val="accent2"/>
-            </a:lnRef>
-            <a:fillRef idx="2">
-              <a:schemeClr val="accent2"/>
-            </a:fillRef>
-            <a:effectRef idx="1">
-              <a:schemeClr val="accent2"/>
-            </a:effectRef>
-            <a:fontRef idx="minor">
-              <a:schemeClr val="dk1"/>
-            </a:fontRef>
-          </p:style>
-        </p:cxnSp>
-        <p:cxnSp>
-          <p:nvCxnSpPr>
-            <p:cNvPr id="83" name="Elbow Connector 82"/>
-            <p:cNvCxnSpPr>
-              <a:stCxn id="48" idx="1"/>
-              <a:endCxn id="79" idx="3"/>
-            </p:cNvCxnSpPr>
-            <p:nvPr/>
-          </p:nvCxnSpPr>
-          <p:spPr>
-            <a:xfrm>
-              <a:off x="7010399" y="1163980"/>
-              <a:ext cx="228601" cy="228600"/>
-            </a:xfrm>
-            <a:prstGeom prst="bentConnector3">
-              <a:avLst>
-                <a:gd name="adj1" fmla="val 50000"/>
-              </a:avLst>
-            </a:prstGeom>
-            <a:grpFill/>
-            <a:ln w="19050">
-              <a:solidFill>
-                <a:srgbClr val="0070C0"/>
-              </a:solidFill>
-              <a:headEnd type="none" w="med" len="med"/>
-              <a:tailEnd type="none" w="med" len="med"/>
-            </a:ln>
-            <a:effectLst/>
-          </p:spPr>
-          <p:style>
-            <a:lnRef idx="1">
-              <a:schemeClr val="accent2"/>
-            </a:lnRef>
-            <a:fillRef idx="2">
-              <a:schemeClr val="accent2"/>
-            </a:fillRef>
-            <a:effectRef idx="1">
-              <a:schemeClr val="accent2"/>
-            </a:effectRef>
-            <a:fontRef idx="minor">
-              <a:schemeClr val="dk1"/>
-            </a:fontRef>
-          </p:style>
-        </p:cxnSp>
-      </p:grpSp>
-      <p:grpSp>
-        <p:nvGrpSpPr>
-          <p:cNvPr id="89" name="Group 88"/>
-          <p:cNvGrpSpPr/>
-          <p:nvPr/>
-        </p:nvGrpSpPr>
-        <p:grpSpPr>
-          <a:xfrm>
-            <a:off x="7010400" y="1634440"/>
-            <a:ext cx="1414999" cy="803960"/>
-            <a:chOff x="7010399" y="762000"/>
-            <a:chExt cx="1414999" cy="803960"/>
-          </a:xfrm>
-          <a:solidFill>
-            <a:schemeClr val="tx2">
-              <a:lumMod val="20000"/>
-              <a:lumOff val="80000"/>
-            </a:schemeClr>
-          </a:solidFill>
-        </p:grpSpPr>
-        <p:sp>
-          <p:nvSpPr>
-            <p:cNvPr id="90" name="Rectangle 11"/>
-            <p:cNvSpPr/>
-            <p:nvPr/>
-          </p:nvSpPr>
-          <p:spPr>
-            <a:xfrm flipH="1">
-              <a:off x="7239000" y="762000"/>
-              <a:ext cx="1186398" cy="346760"/>
-            </a:xfrm>
-            <a:prstGeom prst="rect">
-              <a:avLst/>
-            </a:prstGeom>
-            <a:grpFill/>
-            <a:ln w="19050">
-              <a:solidFill>
-                <a:srgbClr val="0070C0"/>
-              </a:solidFill>
-              <a:headEnd type="none" w="med" len="med"/>
-              <a:tailEnd type="none" w="med" len="med"/>
-            </a:ln>
-            <a:effectLst/>
-          </p:spPr>
-          <p:style>
-            <a:lnRef idx="1">
-              <a:schemeClr val="accent2"/>
-            </a:lnRef>
-            <a:fillRef idx="2">
-              <a:schemeClr val="accent2"/>
-            </a:fillRef>
-            <a:effectRef idx="1">
-              <a:schemeClr val="accent2"/>
-            </a:effectRef>
-            <a:fontRef idx="minor">
-              <a:schemeClr val="dk1"/>
-            </a:fontRef>
-          </p:style>
-          <p:txBody>
-            <a:bodyPr rtlCol="0" anchor="ctr"/>
-            <a:lstStyle/>
-            <a:p>
-              <a:pPr algn="ctr"/>
-              <a:r>
-                <a:rPr lang="en-US" sz="950" b="1" dirty="0" err="1" smtClean="0">
-                  <a:solidFill>
-                    <a:srgbClr val="0070C0"/>
-                  </a:solidFill>
-                </a:rPr>
-                <a:t>EditTaskCommand</a:t>
-              </a:r>
-              <a:endParaRPr lang="en-SG" sz="950" b="1" dirty="0">
-                <a:solidFill>
-                  <a:srgbClr val="0070C0"/>
-                </a:solidFill>
-              </a:endParaRPr>
-            </a:p>
-          </p:txBody>
-        </p:sp>
-        <p:sp>
-          <p:nvSpPr>
-            <p:cNvPr id="91" name="Rectangle 11"/>
-            <p:cNvSpPr/>
-            <p:nvPr/>
-          </p:nvSpPr>
-          <p:spPr>
-            <a:xfrm flipH="1">
-              <a:off x="7239000" y="1219200"/>
-              <a:ext cx="1186398" cy="346760"/>
-            </a:xfrm>
-            <a:prstGeom prst="rect">
-              <a:avLst/>
-            </a:prstGeom>
-            <a:grpFill/>
-            <a:ln w="19050">
-              <a:solidFill>
-                <a:srgbClr val="0070C0"/>
-              </a:solidFill>
-              <a:headEnd type="none" w="med" len="med"/>
-              <a:tailEnd type="none" w="med" len="med"/>
-            </a:ln>
-            <a:effectLst/>
-          </p:spPr>
-          <p:style>
-            <a:lnRef idx="1">
-              <a:schemeClr val="accent2"/>
-            </a:lnRef>
-            <a:fillRef idx="2">
-              <a:schemeClr val="accent2"/>
-            </a:fillRef>
-            <a:effectRef idx="1">
-              <a:schemeClr val="accent2"/>
-            </a:effectRef>
-            <a:fontRef idx="minor">
-              <a:schemeClr val="dk1"/>
-            </a:fontRef>
-          </p:style>
-          <p:txBody>
-            <a:bodyPr rtlCol="0" anchor="ctr"/>
-            <a:lstStyle/>
-            <a:p>
-              <a:pPr algn="ctr"/>
-              <a:r>
-                <a:rPr lang="en-US" sz="950" b="1" dirty="0" err="1" smtClean="0">
-                  <a:solidFill>
-                    <a:srgbClr val="0070C0"/>
-                  </a:solidFill>
-                </a:rPr>
-                <a:t>EditEventCommand</a:t>
-              </a:r>
-              <a:endParaRPr lang="en-SG" sz="950" b="1" dirty="0">
-                <a:solidFill>
-                  <a:srgbClr val="0070C0"/>
-                </a:solidFill>
-              </a:endParaRPr>
-            </a:p>
-          </p:txBody>
-        </p:sp>
-        <p:cxnSp>
-          <p:nvCxnSpPr>
-            <p:cNvPr id="92" name="Elbow Connector 91"/>
-            <p:cNvCxnSpPr>
-              <a:endCxn id="90" idx="3"/>
-            </p:cNvCxnSpPr>
-            <p:nvPr/>
-          </p:nvCxnSpPr>
-          <p:spPr>
-            <a:xfrm flipV="1">
-              <a:off x="7010399" y="935380"/>
-              <a:ext cx="228601" cy="228600"/>
-            </a:xfrm>
-            <a:prstGeom prst="bentConnector3">
-              <a:avLst/>
-            </a:prstGeom>
-            <a:grpFill/>
-            <a:ln w="19050">
-              <a:solidFill>
-                <a:srgbClr val="0070C0"/>
-              </a:solidFill>
-              <a:headEnd type="none" w="med" len="med"/>
-              <a:tailEnd type="none" w="med" len="med"/>
-            </a:ln>
-            <a:effectLst/>
-          </p:spPr>
-          <p:style>
-            <a:lnRef idx="1">
-              <a:schemeClr val="accent2"/>
-            </a:lnRef>
-            <a:fillRef idx="2">
-              <a:schemeClr val="accent2"/>
-            </a:fillRef>
-            <a:effectRef idx="1">
-              <a:schemeClr val="accent2"/>
-            </a:effectRef>
-            <a:fontRef idx="minor">
-              <a:schemeClr val="dk1"/>
-            </a:fontRef>
-          </p:style>
-        </p:cxnSp>
-        <p:cxnSp>
-          <p:nvCxnSpPr>
-            <p:cNvPr id="93" name="Elbow Connector 92"/>
-            <p:cNvCxnSpPr>
-              <a:endCxn id="91" idx="3"/>
-            </p:cNvCxnSpPr>
-            <p:nvPr/>
-          </p:nvCxnSpPr>
-          <p:spPr>
-            <a:xfrm>
-              <a:off x="7010399" y="1163980"/>
-              <a:ext cx="228601" cy="228600"/>
-            </a:xfrm>
-            <a:prstGeom prst="bentConnector3">
-              <a:avLst>
-                <a:gd name="adj1" fmla="val 50000"/>
-              </a:avLst>
-            </a:prstGeom>
-            <a:grpFill/>
-            <a:ln w="19050">
-              <a:solidFill>
-                <a:srgbClr val="0070C0"/>
-              </a:solidFill>
-              <a:headEnd type="none" w="med" len="med"/>
-              <a:tailEnd type="none" w="med" len="med"/>
-            </a:ln>
-            <a:effectLst/>
-          </p:spPr>
-          <p:style>
-            <a:lnRef idx="1">
-              <a:schemeClr val="accent2"/>
-            </a:lnRef>
-            <a:fillRef idx="2">
-              <a:schemeClr val="accent2"/>
-            </a:fillRef>
-            <a:effectRef idx="1">
-              <a:schemeClr val="accent2"/>
-            </a:effectRef>
-            <a:fontRef idx="minor">
-              <a:schemeClr val="dk1"/>
-            </a:fontRef>
-          </p:style>
-        </p:cxnSp>
-      </p:grpSp>
-      <p:grpSp>
-        <p:nvGrpSpPr>
-          <p:cNvPr id="94" name="Group 93"/>
-          <p:cNvGrpSpPr/>
-          <p:nvPr/>
-        </p:nvGrpSpPr>
-        <p:grpSpPr>
-          <a:xfrm>
-            <a:off x="7010400" y="2819400"/>
-            <a:ext cx="1414999" cy="803960"/>
-            <a:chOff x="7010399" y="762000"/>
-            <a:chExt cx="1414999" cy="803960"/>
-          </a:xfrm>
-          <a:solidFill>
-            <a:schemeClr val="tx2">
-              <a:lumMod val="20000"/>
-              <a:lumOff val="80000"/>
-            </a:schemeClr>
-          </a:solidFill>
-        </p:grpSpPr>
-        <p:sp>
-          <p:nvSpPr>
-            <p:cNvPr id="95" name="Rectangle 11"/>
-            <p:cNvSpPr/>
-            <p:nvPr/>
-          </p:nvSpPr>
-          <p:spPr>
-            <a:xfrm flipH="1">
-              <a:off x="7239000" y="762000"/>
-              <a:ext cx="1186398" cy="346760"/>
-            </a:xfrm>
-            <a:prstGeom prst="rect">
-              <a:avLst/>
-            </a:prstGeom>
-            <a:grpFill/>
-            <a:ln w="19050">
-              <a:solidFill>
-                <a:srgbClr val="0070C0"/>
-              </a:solidFill>
-              <a:headEnd type="none" w="med" len="med"/>
-              <a:tailEnd type="none" w="med" len="med"/>
-            </a:ln>
-            <a:effectLst/>
-          </p:spPr>
-          <p:style>
-            <a:lnRef idx="1">
-              <a:schemeClr val="accent2"/>
-            </a:lnRef>
-            <a:fillRef idx="2">
-              <a:schemeClr val="accent2"/>
-            </a:fillRef>
-            <a:effectRef idx="1">
-              <a:schemeClr val="accent2"/>
-            </a:effectRef>
-            <a:fontRef idx="minor">
-              <a:schemeClr val="dk1"/>
-            </a:fontRef>
-          </p:style>
-          <p:txBody>
-            <a:bodyPr rtlCol="0" anchor="ctr"/>
-            <a:lstStyle/>
-            <a:p>
-              <a:pPr algn="ctr"/>
-              <a:r>
-                <a:rPr lang="en-US" sz="950" b="1" dirty="0" err="1" smtClean="0">
-                  <a:solidFill>
-                    <a:srgbClr val="0070C0"/>
-                  </a:solidFill>
-                </a:rPr>
-                <a:t>DeleteTask</a:t>
-              </a:r>
-              <a:endParaRPr lang="en-US" sz="950" b="1" dirty="0" smtClean="0">
-                <a:solidFill>
-                  <a:srgbClr val="0070C0"/>
-                </a:solidFill>
-              </a:endParaRPr>
-            </a:p>
-            <a:p>
-              <a:pPr algn="ctr"/>
-              <a:r>
-                <a:rPr lang="en-US" sz="950" b="1" dirty="0" smtClean="0">
-                  <a:solidFill>
-                    <a:srgbClr val="0070C0"/>
-                  </a:solidFill>
-                </a:rPr>
-                <a:t>Command</a:t>
-              </a:r>
-              <a:endParaRPr lang="en-SG" sz="950" b="1" dirty="0">
-                <a:solidFill>
-                  <a:srgbClr val="0070C0"/>
-                </a:solidFill>
-              </a:endParaRPr>
-            </a:p>
-          </p:txBody>
-        </p:sp>
-        <p:sp>
-          <p:nvSpPr>
-            <p:cNvPr id="96" name="Rectangle 11"/>
-            <p:cNvSpPr/>
-            <p:nvPr/>
-          </p:nvSpPr>
-          <p:spPr>
-            <a:xfrm flipH="1">
-              <a:off x="7239000" y="1219200"/>
-              <a:ext cx="1186398" cy="346760"/>
-            </a:xfrm>
-            <a:prstGeom prst="rect">
-              <a:avLst/>
-            </a:prstGeom>
-            <a:grpFill/>
-            <a:ln w="19050">
-              <a:solidFill>
-                <a:srgbClr val="0070C0"/>
-              </a:solidFill>
-              <a:headEnd type="none" w="med" len="med"/>
-              <a:tailEnd type="none" w="med" len="med"/>
-            </a:ln>
-            <a:effectLst/>
-          </p:spPr>
-          <p:style>
-            <a:lnRef idx="1">
-              <a:schemeClr val="accent2"/>
-            </a:lnRef>
-            <a:fillRef idx="2">
-              <a:schemeClr val="accent2"/>
-            </a:fillRef>
-            <a:effectRef idx="1">
-              <a:schemeClr val="accent2"/>
-            </a:effectRef>
-            <a:fontRef idx="minor">
-              <a:schemeClr val="dk1"/>
-            </a:fontRef>
-          </p:style>
-          <p:txBody>
-            <a:bodyPr rtlCol="0" anchor="ctr"/>
-            <a:lstStyle/>
-            <a:p>
-              <a:pPr algn="ctr"/>
-              <a:r>
-                <a:rPr lang="en-US" sz="950" b="1" dirty="0" err="1" smtClean="0">
-                  <a:solidFill>
-                    <a:srgbClr val="0070C0"/>
-                  </a:solidFill>
-                </a:rPr>
-                <a:t>DeleteEvent</a:t>
-              </a:r>
-              <a:endParaRPr lang="en-US" sz="950" b="1" dirty="0" smtClean="0">
-                <a:solidFill>
-                  <a:srgbClr val="0070C0"/>
-                </a:solidFill>
-              </a:endParaRPr>
-            </a:p>
-            <a:p>
-              <a:pPr algn="ctr"/>
-              <a:r>
-                <a:rPr lang="en-US" sz="950" b="1" dirty="0" smtClean="0">
-                  <a:solidFill>
-                    <a:srgbClr val="0070C0"/>
-                  </a:solidFill>
-                </a:rPr>
-                <a:t>Command</a:t>
-              </a:r>
-              <a:endParaRPr lang="en-SG" sz="950" b="1" dirty="0">
-                <a:solidFill>
-                  <a:srgbClr val="0070C0"/>
-                </a:solidFill>
-              </a:endParaRPr>
-            </a:p>
-          </p:txBody>
-        </p:sp>
-        <p:cxnSp>
-          <p:nvCxnSpPr>
-            <p:cNvPr id="97" name="Elbow Connector 96"/>
-            <p:cNvCxnSpPr>
-              <a:endCxn id="95" idx="3"/>
-            </p:cNvCxnSpPr>
-            <p:nvPr/>
-          </p:nvCxnSpPr>
-          <p:spPr>
-            <a:xfrm flipV="1">
-              <a:off x="7010399" y="935380"/>
-              <a:ext cx="228601" cy="228600"/>
-            </a:xfrm>
-            <a:prstGeom prst="bentConnector3">
-              <a:avLst/>
-            </a:prstGeom>
-            <a:grpFill/>
-            <a:ln w="19050">
-              <a:solidFill>
-                <a:srgbClr val="0070C0"/>
-              </a:solidFill>
-              <a:headEnd type="none" w="med" len="med"/>
-              <a:tailEnd type="none" w="med" len="med"/>
-            </a:ln>
-            <a:effectLst/>
-          </p:spPr>
-          <p:style>
-            <a:lnRef idx="1">
-              <a:schemeClr val="accent2"/>
-            </a:lnRef>
-            <a:fillRef idx="2">
-              <a:schemeClr val="accent2"/>
-            </a:fillRef>
-            <a:effectRef idx="1">
-              <a:schemeClr val="accent2"/>
-            </a:effectRef>
-            <a:fontRef idx="minor">
-              <a:schemeClr val="dk1"/>
-            </a:fontRef>
-          </p:style>
-        </p:cxnSp>
-        <p:cxnSp>
-          <p:nvCxnSpPr>
-            <p:cNvPr id="98" name="Elbow Connector 97"/>
-            <p:cNvCxnSpPr>
-              <a:endCxn id="96" idx="3"/>
-            </p:cNvCxnSpPr>
-            <p:nvPr/>
-          </p:nvCxnSpPr>
-          <p:spPr>
-            <a:xfrm>
-              <a:off x="7010399" y="1163980"/>
-              <a:ext cx="228601" cy="228600"/>
-            </a:xfrm>
-            <a:prstGeom prst="bentConnector3">
-              <a:avLst>
-                <a:gd name="adj1" fmla="val 50000"/>
-              </a:avLst>
-            </a:prstGeom>
-            <a:grpFill/>
-            <a:ln w="19050">
-              <a:solidFill>
-                <a:srgbClr val="0070C0"/>
-              </a:solidFill>
-              <a:headEnd type="none" w="med" len="med"/>
-              <a:tailEnd type="none" w="med" len="med"/>
-            </a:ln>
-            <a:effectLst/>
-          </p:spPr>
-          <p:style>
-            <a:lnRef idx="1">
-              <a:schemeClr val="accent2"/>
-            </a:lnRef>
-            <a:fillRef idx="2">
-              <a:schemeClr val="accent2"/>
-            </a:fillRef>
-            <a:effectRef idx="1">
-              <a:schemeClr val="accent2"/>
-            </a:effectRef>
-            <a:fontRef idx="minor">
-              <a:schemeClr val="dk1"/>
-            </a:fontRef>
-          </p:style>
-        </p:cxnSp>
-      </p:grpSp>
-      <p:grpSp>
-        <p:nvGrpSpPr>
-          <p:cNvPr id="99" name="Group 98"/>
-          <p:cNvGrpSpPr/>
-          <p:nvPr/>
-        </p:nvGrpSpPr>
-        <p:grpSpPr>
-          <a:xfrm>
-            <a:off x="7010400" y="4038600"/>
-            <a:ext cx="1414999" cy="803960"/>
-            <a:chOff x="7010399" y="762000"/>
-            <a:chExt cx="1414999" cy="803960"/>
-          </a:xfrm>
-          <a:solidFill>
-            <a:schemeClr val="tx2">
-              <a:lumMod val="20000"/>
-              <a:lumOff val="80000"/>
-            </a:schemeClr>
-          </a:solidFill>
-        </p:grpSpPr>
-        <p:sp>
-          <p:nvSpPr>
-            <p:cNvPr id="100" name="Rectangle 11"/>
-            <p:cNvSpPr/>
-            <p:nvPr/>
-          </p:nvSpPr>
-          <p:spPr>
-            <a:xfrm flipH="1">
-              <a:off x="7239000" y="762000"/>
-              <a:ext cx="1186398" cy="346760"/>
-            </a:xfrm>
-            <a:prstGeom prst="rect">
-              <a:avLst/>
-            </a:prstGeom>
-            <a:grpFill/>
-            <a:ln w="19050">
-              <a:solidFill>
-                <a:srgbClr val="0070C0"/>
-              </a:solidFill>
-              <a:headEnd type="none" w="med" len="med"/>
-              <a:tailEnd type="none" w="med" len="med"/>
-            </a:ln>
-            <a:effectLst/>
-          </p:spPr>
-          <p:style>
-            <a:lnRef idx="1">
-              <a:schemeClr val="accent2"/>
-            </a:lnRef>
-            <a:fillRef idx="2">
-              <a:schemeClr val="accent2"/>
-            </a:fillRef>
-            <a:effectRef idx="1">
-              <a:schemeClr val="accent2"/>
-            </a:effectRef>
-            <a:fontRef idx="minor">
-              <a:schemeClr val="dk1"/>
-            </a:fontRef>
-          </p:style>
-          <p:txBody>
-            <a:bodyPr rtlCol="0" anchor="ctr"/>
-            <a:lstStyle/>
-            <a:p>
-              <a:pPr algn="ctr"/>
-              <a:r>
-                <a:rPr lang="en-US" sz="950" b="1" dirty="0" err="1" smtClean="0">
-                  <a:solidFill>
-                    <a:srgbClr val="0070C0"/>
-                  </a:solidFill>
-                </a:rPr>
-                <a:t>ListTaskCommand</a:t>
-              </a:r>
-              <a:endParaRPr lang="en-SG" sz="950" b="1" dirty="0">
-                <a:solidFill>
-                  <a:srgbClr val="0070C0"/>
-                </a:solidFill>
-              </a:endParaRPr>
-            </a:p>
-          </p:txBody>
-        </p:sp>
-        <p:sp>
-          <p:nvSpPr>
-            <p:cNvPr id="101" name="Rectangle 11"/>
-            <p:cNvSpPr/>
-            <p:nvPr/>
-          </p:nvSpPr>
-          <p:spPr>
-            <a:xfrm flipH="1">
-              <a:off x="7239000" y="1219200"/>
-              <a:ext cx="1186398" cy="346760"/>
-            </a:xfrm>
-            <a:prstGeom prst="rect">
-              <a:avLst/>
-            </a:prstGeom>
-            <a:grpFill/>
-            <a:ln w="19050">
-              <a:solidFill>
-                <a:srgbClr val="0070C0"/>
-              </a:solidFill>
-              <a:headEnd type="none" w="med" len="med"/>
-              <a:tailEnd type="none" w="med" len="med"/>
-            </a:ln>
-            <a:effectLst/>
-          </p:spPr>
-          <p:style>
-            <a:lnRef idx="1">
-              <a:schemeClr val="accent2"/>
-            </a:lnRef>
-            <a:fillRef idx="2">
-              <a:schemeClr val="accent2"/>
-            </a:fillRef>
-            <a:effectRef idx="1">
-              <a:schemeClr val="accent2"/>
-            </a:effectRef>
-            <a:fontRef idx="minor">
-              <a:schemeClr val="dk1"/>
-            </a:fontRef>
-          </p:style>
-          <p:txBody>
-            <a:bodyPr rtlCol="0" anchor="ctr"/>
-            <a:lstStyle/>
-            <a:p>
-              <a:pPr algn="ctr"/>
-              <a:r>
-                <a:rPr lang="en-US" sz="950" b="1" dirty="0" err="1" smtClean="0">
-                  <a:solidFill>
-                    <a:srgbClr val="0070C0"/>
-                  </a:solidFill>
-                </a:rPr>
-                <a:t>ListEventCommand</a:t>
-              </a:r>
-              <a:endParaRPr lang="en-SG" sz="950" b="1" dirty="0">
-                <a:solidFill>
-                  <a:srgbClr val="0070C0"/>
-                </a:solidFill>
-              </a:endParaRPr>
-            </a:p>
-          </p:txBody>
-        </p:sp>
-        <p:cxnSp>
-          <p:nvCxnSpPr>
-            <p:cNvPr id="102" name="Elbow Connector 101"/>
-            <p:cNvCxnSpPr>
-              <a:endCxn id="100" idx="3"/>
-            </p:cNvCxnSpPr>
-            <p:nvPr/>
-          </p:nvCxnSpPr>
-          <p:spPr>
-            <a:xfrm flipV="1">
-              <a:off x="7010399" y="935380"/>
-              <a:ext cx="228601" cy="228600"/>
-            </a:xfrm>
-            <a:prstGeom prst="bentConnector3">
-              <a:avLst/>
-            </a:prstGeom>
-            <a:grpFill/>
-            <a:ln w="19050">
-              <a:solidFill>
-                <a:srgbClr val="0070C0"/>
-              </a:solidFill>
-              <a:headEnd type="none" w="med" len="med"/>
-              <a:tailEnd type="none" w="med" len="med"/>
-            </a:ln>
-            <a:effectLst/>
-          </p:spPr>
-          <p:style>
-            <a:lnRef idx="1">
-              <a:schemeClr val="accent2"/>
-            </a:lnRef>
-            <a:fillRef idx="2">
-              <a:schemeClr val="accent2"/>
-            </a:fillRef>
-            <a:effectRef idx="1">
-              <a:schemeClr val="accent2"/>
-            </a:effectRef>
-            <a:fontRef idx="minor">
-              <a:schemeClr val="dk1"/>
-            </a:fontRef>
-          </p:style>
-        </p:cxnSp>
-        <p:cxnSp>
-          <p:nvCxnSpPr>
-            <p:cNvPr id="103" name="Elbow Connector 102"/>
-            <p:cNvCxnSpPr>
-              <a:endCxn id="101" idx="3"/>
-            </p:cNvCxnSpPr>
-            <p:nvPr/>
-          </p:nvCxnSpPr>
-          <p:spPr>
-            <a:xfrm>
-              <a:off x="7010399" y="1163980"/>
-              <a:ext cx="228601" cy="228600"/>
-            </a:xfrm>
-            <a:prstGeom prst="bentConnector3">
-              <a:avLst>
-                <a:gd name="adj1" fmla="val 50000"/>
-              </a:avLst>
-            </a:prstGeom>
-            <a:grpFill/>
-            <a:ln w="19050">
-              <a:solidFill>
-                <a:srgbClr val="0070C0"/>
-              </a:solidFill>
-              <a:headEnd type="none" w="med" len="med"/>
-              <a:tailEnd type="none" w="med" len="med"/>
-            </a:ln>
-            <a:effectLst/>
-          </p:spPr>
-          <p:style>
-            <a:lnRef idx="1">
-              <a:schemeClr val="accent2"/>
-            </a:lnRef>
-            <a:fillRef idx="2">
-              <a:schemeClr val="accent2"/>
-            </a:fillRef>
-            <a:effectRef idx="1">
-              <a:schemeClr val="accent2"/>
-            </a:effectRef>
-            <a:fontRef idx="minor">
-              <a:schemeClr val="dk1"/>
-            </a:fontRef>
-          </p:style>
-        </p:cxnSp>
-      </p:grpSp>
-      <p:sp>
-        <p:nvSpPr>
-          <p:cNvPr id="144" name="Rectangle 11"/>
-          <p:cNvSpPr/>
-          <p:nvPr/>
-        </p:nvSpPr>
-        <p:spPr>
-          <a:xfrm flipH="1">
-            <a:off x="1970602" y="4419600"/>
-            <a:ext cx="1186398" cy="346760"/>
-          </a:xfrm>
-          <a:prstGeom prst="rect">
-            <a:avLst/>
-          </a:prstGeom>
-          <a:ln w="19050">
-            <a:solidFill>
-              <a:srgbClr val="0070C0"/>
-            </a:solidFill>
-          </a:ln>
-          <a:effectLst/>
-        </p:spPr>
-        <p:style>
-          <a:lnRef idx="1">
-            <a:schemeClr val="accent1"/>
-          </a:lnRef>
-          <a:fillRef idx="2">
-            <a:schemeClr val="accent1"/>
-          </a:fillRef>
-          <a:effectRef idx="1">
-            <a:schemeClr val="accent1"/>
-          </a:effectRef>
-          <a:fontRef idx="minor">
-            <a:schemeClr val="dk1"/>
-          </a:fontRef>
-        </p:style>
-        <p:txBody>
-          <a:bodyPr rtlCol="0" anchor="ctr"/>
-          <a:lstStyle/>
-          <a:p>
-            <a:pPr algn="ctr"/>
-            <a:r>
-              <a:rPr lang="en-US" sz="1050" b="1" dirty="0" err="1" smtClean="0">
-                <a:solidFill>
-                  <a:srgbClr val="0070C0"/>
-                </a:solidFill>
-              </a:rPr>
-              <a:t>EditParser</a:t>
-            </a:r>
-            <a:endParaRPr lang="en-SG" sz="1050" b="1" dirty="0">
-              <a:solidFill>
-                <a:srgbClr val="0070C0"/>
-              </a:solidFill>
-            </a:endParaRPr>
-          </a:p>
-        </p:txBody>
-      </p:sp>
-      <p:sp>
-        <p:nvSpPr>
-          <p:cNvPr id="145" name="Rectangle 11"/>
-          <p:cNvSpPr/>
-          <p:nvPr/>
-        </p:nvSpPr>
-        <p:spPr>
-          <a:xfrm flipH="1">
-            <a:off x="1967281" y="4003568"/>
-            <a:ext cx="1186398" cy="346760"/>
-          </a:xfrm>
-          <a:prstGeom prst="rect">
-            <a:avLst/>
-          </a:prstGeom>
-          <a:ln w="19050">
-            <a:solidFill>
-              <a:srgbClr val="0070C0"/>
-            </a:solidFill>
-          </a:ln>
-          <a:effectLst/>
-        </p:spPr>
-        <p:style>
-          <a:lnRef idx="1">
-            <a:schemeClr val="accent1"/>
-          </a:lnRef>
-          <a:fillRef idx="2">
-            <a:schemeClr val="accent1"/>
-          </a:fillRef>
-          <a:effectRef idx="1">
-            <a:schemeClr val="accent1"/>
-          </a:effectRef>
-          <a:fontRef idx="minor">
-            <a:schemeClr val="dk1"/>
-          </a:fontRef>
-        </p:style>
-        <p:txBody>
-          <a:bodyPr rtlCol="0" anchor="ctr"/>
-          <a:lstStyle/>
-          <a:p>
-            <a:pPr algn="ctr"/>
-            <a:r>
-              <a:rPr lang="en-US" sz="1050" b="1" dirty="0" err="1" smtClean="0">
-                <a:solidFill>
-                  <a:srgbClr val="0070C0"/>
-                </a:solidFill>
-              </a:rPr>
-              <a:t>HelpParser</a:t>
-            </a:r>
-            <a:endParaRPr lang="en-SG" sz="1050" b="1" dirty="0">
-              <a:solidFill>
-                <a:srgbClr val="0070C0"/>
-              </a:solidFill>
-            </a:endParaRPr>
-          </a:p>
-        </p:txBody>
-      </p:sp>
-      <p:sp>
-        <p:nvSpPr>
-          <p:cNvPr id="146" name="Rectangle 11"/>
-          <p:cNvSpPr/>
-          <p:nvPr/>
-        </p:nvSpPr>
-        <p:spPr>
-          <a:xfrm flipH="1">
-            <a:off x="1970602" y="3581400"/>
-            <a:ext cx="1186398" cy="346760"/>
-          </a:xfrm>
-          <a:prstGeom prst="rect">
-            <a:avLst/>
-          </a:prstGeom>
-          <a:ln w="19050">
-            <a:solidFill>
-              <a:srgbClr val="0070C0"/>
-            </a:solidFill>
-          </a:ln>
-          <a:effectLst/>
-        </p:spPr>
-        <p:style>
-          <a:lnRef idx="1">
-            <a:schemeClr val="accent1"/>
-          </a:lnRef>
-          <a:fillRef idx="2">
-            <a:schemeClr val="accent1"/>
-          </a:fillRef>
-          <a:effectRef idx="1">
-            <a:schemeClr val="accent1"/>
-          </a:effectRef>
-          <a:fontRef idx="minor">
-            <a:schemeClr val="dk1"/>
-          </a:fontRef>
-        </p:style>
-        <p:txBody>
-          <a:bodyPr rtlCol="0" anchor="ctr"/>
-          <a:lstStyle/>
-          <a:p>
-            <a:pPr algn="ctr"/>
-            <a:r>
-              <a:rPr lang="en-US" sz="1050" b="1" dirty="0" err="1" smtClean="0">
-                <a:solidFill>
-                  <a:srgbClr val="0070C0"/>
-                </a:solidFill>
-              </a:rPr>
-              <a:t>AddParser</a:t>
-            </a:r>
-            <a:endParaRPr lang="en-SG" sz="1050" b="1" dirty="0">
-              <a:solidFill>
-                <a:srgbClr val="0070C0"/>
-              </a:solidFill>
-            </a:endParaRPr>
-          </a:p>
-        </p:txBody>
-      </p:sp>
-      <p:grpSp>
-        <p:nvGrpSpPr>
-          <p:cNvPr id="147" name="Group 146"/>
-          <p:cNvGrpSpPr/>
-          <p:nvPr/>
-        </p:nvGrpSpPr>
-        <p:grpSpPr>
-          <a:xfrm>
-            <a:off x="3157000" y="3352800"/>
-            <a:ext cx="1414999" cy="803960"/>
-            <a:chOff x="7010399" y="762000"/>
-            <a:chExt cx="1414999" cy="803960"/>
-          </a:xfrm>
-          <a:solidFill>
-            <a:schemeClr val="tx2">
-              <a:lumMod val="20000"/>
-              <a:lumOff val="80000"/>
-            </a:schemeClr>
-          </a:solidFill>
-        </p:grpSpPr>
-        <p:sp>
-          <p:nvSpPr>
-            <p:cNvPr id="148" name="Rectangle 11"/>
-            <p:cNvSpPr/>
-            <p:nvPr/>
-          </p:nvSpPr>
-          <p:spPr>
-            <a:xfrm flipH="1">
-              <a:off x="7239000" y="762000"/>
-              <a:ext cx="1186398" cy="346760"/>
-            </a:xfrm>
-            <a:prstGeom prst="rect">
-              <a:avLst/>
-            </a:prstGeom>
-            <a:grpFill/>
-            <a:ln w="19050">
-              <a:solidFill>
-                <a:srgbClr val="0070C0"/>
-              </a:solidFill>
-              <a:headEnd type="none" w="med" len="med"/>
-              <a:tailEnd type="none" w="med" len="med"/>
-            </a:ln>
-            <a:effectLst/>
-          </p:spPr>
-          <p:style>
-            <a:lnRef idx="1">
-              <a:schemeClr val="accent2"/>
-            </a:lnRef>
-            <a:fillRef idx="2">
-              <a:schemeClr val="accent2"/>
-            </a:fillRef>
-            <a:effectRef idx="1">
-              <a:schemeClr val="accent2"/>
-            </a:effectRef>
-            <a:fontRef idx="minor">
-              <a:schemeClr val="dk1"/>
-            </a:fontRef>
-          </p:style>
-          <p:txBody>
-            <a:bodyPr rtlCol="0" anchor="ctr"/>
-            <a:lstStyle/>
-            <a:p>
-              <a:pPr algn="ctr"/>
-              <a:r>
-                <a:rPr lang="en-US" sz="950" b="1" dirty="0" err="1" smtClean="0">
-                  <a:solidFill>
-                    <a:srgbClr val="0070C0"/>
-                  </a:solidFill>
-                </a:rPr>
-                <a:t>AddTaskParser</a:t>
-              </a:r>
-              <a:endParaRPr lang="en-SG" sz="950" b="1" dirty="0">
-                <a:solidFill>
-                  <a:srgbClr val="0070C0"/>
-                </a:solidFill>
-              </a:endParaRPr>
-            </a:p>
-          </p:txBody>
-        </p:sp>
-        <p:sp>
-          <p:nvSpPr>
-            <p:cNvPr id="149" name="Rectangle 11"/>
-            <p:cNvSpPr/>
-            <p:nvPr/>
-          </p:nvSpPr>
-          <p:spPr>
-            <a:xfrm flipH="1">
-              <a:off x="7239000" y="1219200"/>
-              <a:ext cx="1186398" cy="346760"/>
-            </a:xfrm>
-            <a:prstGeom prst="rect">
-              <a:avLst/>
-            </a:prstGeom>
-            <a:grpFill/>
-            <a:ln w="19050">
-              <a:solidFill>
-                <a:srgbClr val="0070C0"/>
-              </a:solidFill>
-              <a:headEnd type="none" w="med" len="med"/>
-              <a:tailEnd type="none" w="med" len="med"/>
-            </a:ln>
-            <a:effectLst/>
-          </p:spPr>
-          <p:style>
-            <a:lnRef idx="1">
-              <a:schemeClr val="accent2"/>
-            </a:lnRef>
-            <a:fillRef idx="2">
-              <a:schemeClr val="accent2"/>
-            </a:fillRef>
-            <a:effectRef idx="1">
-              <a:schemeClr val="accent2"/>
-            </a:effectRef>
-            <a:fontRef idx="minor">
-              <a:schemeClr val="dk1"/>
-            </a:fontRef>
-          </p:style>
-          <p:txBody>
-            <a:bodyPr rtlCol="0" anchor="ctr"/>
-            <a:lstStyle/>
-            <a:p>
-              <a:pPr algn="ctr"/>
-              <a:r>
-                <a:rPr lang="en-US" sz="950" b="1" dirty="0" err="1" smtClean="0">
-                  <a:solidFill>
-                    <a:srgbClr val="0070C0"/>
-                  </a:solidFill>
-                </a:rPr>
-                <a:t>AddEventParser</a:t>
-              </a:r>
-              <a:endParaRPr lang="en-SG" sz="950" b="1" dirty="0">
-                <a:solidFill>
-                  <a:srgbClr val="0070C0"/>
-                </a:solidFill>
-              </a:endParaRPr>
-            </a:p>
-          </p:txBody>
-        </p:sp>
-        <p:cxnSp>
-          <p:nvCxnSpPr>
-            <p:cNvPr id="150" name="Elbow Connector 149"/>
-            <p:cNvCxnSpPr>
-              <a:stCxn id="146" idx="1"/>
-              <a:endCxn id="148" idx="3"/>
-            </p:cNvCxnSpPr>
-            <p:nvPr/>
-          </p:nvCxnSpPr>
-          <p:spPr>
-            <a:xfrm flipV="1">
-              <a:off x="7010399" y="935380"/>
-              <a:ext cx="228601" cy="152400"/>
-            </a:xfrm>
-            <a:prstGeom prst="bentConnector3">
-              <a:avLst/>
-            </a:prstGeom>
-            <a:grpFill/>
-            <a:ln w="19050">
-              <a:solidFill>
-                <a:srgbClr val="0070C0"/>
-              </a:solidFill>
-              <a:headEnd type="none" w="med" len="med"/>
-              <a:tailEnd type="none" w="med" len="med"/>
-            </a:ln>
-            <a:effectLst/>
-          </p:spPr>
-          <p:style>
-            <a:lnRef idx="1">
-              <a:schemeClr val="accent2"/>
-            </a:lnRef>
-            <a:fillRef idx="2">
-              <a:schemeClr val="accent2"/>
-            </a:fillRef>
-            <a:effectRef idx="1">
-              <a:schemeClr val="accent2"/>
-            </a:effectRef>
-            <a:fontRef idx="minor">
-              <a:schemeClr val="dk1"/>
-            </a:fontRef>
-          </p:style>
-        </p:cxnSp>
-        <p:cxnSp>
-          <p:nvCxnSpPr>
-            <p:cNvPr id="151" name="Elbow Connector 150"/>
-            <p:cNvCxnSpPr>
-              <a:stCxn id="146" idx="1"/>
-              <a:endCxn id="149" idx="3"/>
-            </p:cNvCxnSpPr>
-            <p:nvPr/>
-          </p:nvCxnSpPr>
-          <p:spPr>
-            <a:xfrm>
-              <a:off x="7010399" y="1087780"/>
-              <a:ext cx="228601" cy="304800"/>
-            </a:xfrm>
-            <a:prstGeom prst="bentConnector3">
-              <a:avLst>
-                <a:gd name="adj1" fmla="val 50000"/>
-              </a:avLst>
-            </a:prstGeom>
-            <a:grpFill/>
-            <a:ln w="19050">
-              <a:solidFill>
-                <a:srgbClr val="0070C0"/>
-              </a:solidFill>
-              <a:headEnd type="none" w="med" len="med"/>
-              <a:tailEnd type="none" w="med" len="med"/>
-            </a:ln>
-            <a:effectLst/>
-          </p:spPr>
-          <p:style>
-            <a:lnRef idx="1">
-              <a:schemeClr val="accent2"/>
-            </a:lnRef>
-            <a:fillRef idx="2">
-              <a:schemeClr val="accent2"/>
-            </a:fillRef>
-            <a:effectRef idx="1">
-              <a:schemeClr val="accent2"/>
-            </a:effectRef>
-            <a:fontRef idx="minor">
-              <a:schemeClr val="dk1"/>
-            </a:fontRef>
-          </p:style>
-        </p:cxnSp>
-      </p:grpSp>
-      <p:grpSp>
-        <p:nvGrpSpPr>
-          <p:cNvPr id="152" name="Group 151"/>
-          <p:cNvGrpSpPr/>
-          <p:nvPr/>
-        </p:nvGrpSpPr>
-        <p:grpSpPr>
-          <a:xfrm>
-            <a:off x="3157001" y="4225240"/>
-            <a:ext cx="1414999" cy="803960"/>
-            <a:chOff x="7010399" y="762000"/>
-            <a:chExt cx="1414999" cy="803960"/>
-          </a:xfrm>
-          <a:solidFill>
-            <a:schemeClr val="tx2">
-              <a:lumMod val="20000"/>
-              <a:lumOff val="80000"/>
-            </a:schemeClr>
-          </a:solidFill>
-        </p:grpSpPr>
-        <p:sp>
-          <p:nvSpPr>
-            <p:cNvPr id="153" name="Rectangle 11"/>
-            <p:cNvSpPr/>
-            <p:nvPr/>
-          </p:nvSpPr>
-          <p:spPr>
-            <a:xfrm flipH="1">
-              <a:off x="7239000" y="762000"/>
-              <a:ext cx="1186398" cy="346760"/>
-            </a:xfrm>
-            <a:prstGeom prst="rect">
-              <a:avLst/>
-            </a:prstGeom>
-            <a:grpFill/>
-            <a:ln w="19050">
-              <a:solidFill>
-                <a:srgbClr val="0070C0"/>
-              </a:solidFill>
-              <a:headEnd type="none" w="med" len="med"/>
-              <a:tailEnd type="none" w="med" len="med"/>
-            </a:ln>
-            <a:effectLst/>
-          </p:spPr>
-          <p:style>
-            <a:lnRef idx="1">
-              <a:schemeClr val="accent2"/>
-            </a:lnRef>
-            <a:fillRef idx="2">
-              <a:schemeClr val="accent2"/>
-            </a:fillRef>
-            <a:effectRef idx="1">
-              <a:schemeClr val="accent2"/>
-            </a:effectRef>
-            <a:fontRef idx="minor">
-              <a:schemeClr val="dk1"/>
-            </a:fontRef>
-          </p:style>
-          <p:txBody>
-            <a:bodyPr rtlCol="0" anchor="ctr"/>
-            <a:lstStyle/>
-            <a:p>
-              <a:pPr algn="ctr"/>
-              <a:r>
-                <a:rPr lang="en-US" sz="950" b="1" dirty="0" err="1" smtClean="0">
-                  <a:solidFill>
-                    <a:srgbClr val="0070C0"/>
-                  </a:solidFill>
-                </a:rPr>
-                <a:t>EditTaskParser</a:t>
-              </a:r>
-              <a:endParaRPr lang="en-SG" sz="950" b="1" dirty="0">
-                <a:solidFill>
-                  <a:srgbClr val="0070C0"/>
-                </a:solidFill>
-              </a:endParaRPr>
-            </a:p>
-          </p:txBody>
-        </p:sp>
-        <p:sp>
-          <p:nvSpPr>
-            <p:cNvPr id="154" name="Rectangle 11"/>
-            <p:cNvSpPr/>
-            <p:nvPr/>
-          </p:nvSpPr>
-          <p:spPr>
-            <a:xfrm flipH="1">
-              <a:off x="7239000" y="1219200"/>
-              <a:ext cx="1186398" cy="346760"/>
-            </a:xfrm>
-            <a:prstGeom prst="rect">
-              <a:avLst/>
-            </a:prstGeom>
-            <a:grpFill/>
-            <a:ln w="19050">
-              <a:solidFill>
-                <a:srgbClr val="0070C0"/>
-              </a:solidFill>
-              <a:headEnd type="none" w="med" len="med"/>
-              <a:tailEnd type="none" w="med" len="med"/>
-            </a:ln>
-            <a:effectLst/>
-          </p:spPr>
-          <p:style>
-            <a:lnRef idx="1">
-              <a:schemeClr val="accent2"/>
-            </a:lnRef>
-            <a:fillRef idx="2">
-              <a:schemeClr val="accent2"/>
-            </a:fillRef>
-            <a:effectRef idx="1">
-              <a:schemeClr val="accent2"/>
-            </a:effectRef>
-            <a:fontRef idx="minor">
-              <a:schemeClr val="dk1"/>
-            </a:fontRef>
-          </p:style>
-          <p:txBody>
-            <a:bodyPr rtlCol="0" anchor="ctr"/>
-            <a:lstStyle/>
-            <a:p>
-              <a:pPr algn="ctr"/>
-              <a:r>
-                <a:rPr lang="en-US" sz="950" b="1" dirty="0" err="1" smtClean="0">
-                  <a:solidFill>
-                    <a:srgbClr val="0070C0"/>
-                  </a:solidFill>
-                </a:rPr>
-                <a:t>EditEventParser</a:t>
-              </a:r>
-              <a:endParaRPr lang="en-SG" sz="950" b="1" dirty="0">
-                <a:solidFill>
-                  <a:srgbClr val="0070C0"/>
-                </a:solidFill>
-              </a:endParaRPr>
-            </a:p>
-          </p:txBody>
-        </p:sp>
-        <p:cxnSp>
-          <p:nvCxnSpPr>
-            <p:cNvPr id="155" name="Elbow Connector 154"/>
-            <p:cNvCxnSpPr>
-              <a:endCxn id="153" idx="3"/>
-            </p:cNvCxnSpPr>
-            <p:nvPr/>
-          </p:nvCxnSpPr>
-          <p:spPr>
-            <a:xfrm flipV="1">
-              <a:off x="7010399" y="935380"/>
-              <a:ext cx="228601" cy="228600"/>
-            </a:xfrm>
-            <a:prstGeom prst="bentConnector3">
-              <a:avLst/>
-            </a:prstGeom>
-            <a:grpFill/>
-            <a:ln w="19050">
-              <a:solidFill>
-                <a:srgbClr val="0070C0"/>
-              </a:solidFill>
-              <a:headEnd type="none" w="med" len="med"/>
-              <a:tailEnd type="none" w="med" len="med"/>
-            </a:ln>
-            <a:effectLst/>
-          </p:spPr>
-          <p:style>
-            <a:lnRef idx="1">
-              <a:schemeClr val="accent2"/>
-            </a:lnRef>
-            <a:fillRef idx="2">
-              <a:schemeClr val="accent2"/>
-            </a:fillRef>
-            <a:effectRef idx="1">
-              <a:schemeClr val="accent2"/>
-            </a:effectRef>
-            <a:fontRef idx="minor">
-              <a:schemeClr val="dk1"/>
-            </a:fontRef>
-          </p:style>
-        </p:cxnSp>
-        <p:cxnSp>
-          <p:nvCxnSpPr>
-            <p:cNvPr id="156" name="Elbow Connector 155"/>
-            <p:cNvCxnSpPr>
-              <a:endCxn id="154" idx="3"/>
-            </p:cNvCxnSpPr>
-            <p:nvPr/>
-          </p:nvCxnSpPr>
-          <p:spPr>
-            <a:xfrm>
-              <a:off x="7010399" y="1163980"/>
-              <a:ext cx="228601" cy="228600"/>
-            </a:xfrm>
-            <a:prstGeom prst="bentConnector3">
-              <a:avLst>
-                <a:gd name="adj1" fmla="val 50000"/>
-              </a:avLst>
-            </a:prstGeom>
-            <a:grpFill/>
-            <a:ln w="19050">
-              <a:solidFill>
-                <a:srgbClr val="0070C0"/>
-              </a:solidFill>
-              <a:headEnd type="none" w="med" len="med"/>
-              <a:tailEnd type="none" w="med" len="med"/>
-            </a:ln>
-            <a:effectLst/>
-          </p:spPr>
-          <p:style>
-            <a:lnRef idx="1">
-              <a:schemeClr val="accent2"/>
-            </a:lnRef>
-            <a:fillRef idx="2">
-              <a:schemeClr val="accent2"/>
-            </a:fillRef>
-            <a:effectRef idx="1">
-              <a:schemeClr val="accent2"/>
-            </a:effectRef>
-            <a:fontRef idx="minor">
-              <a:schemeClr val="dk1"/>
-            </a:fontRef>
-          </p:style>
-        </p:cxnSp>
-      </p:grpSp>
       <p:sp>
         <p:nvSpPr>
           <p:cNvPr id="171" name="Rectangle 11"/>
@@ -14177,6 +11959,1436 @@
           </a:p>
         </p:txBody>
       </p:sp>
+      <p:sp>
+        <p:nvSpPr>
+          <p:cNvPr id="104" name="Rectangle 11"/>
+          <p:cNvSpPr/>
+          <p:nvPr/>
+        </p:nvSpPr>
+        <p:spPr>
+          <a:xfrm flipH="1">
+            <a:off x="5820675" y="2057400"/>
+            <a:ext cx="1343602" cy="270560"/>
+          </a:xfrm>
+          <a:prstGeom prst="rect">
+            <a:avLst/>
+          </a:prstGeom>
+          <a:ln w="19050">
+            <a:solidFill>
+              <a:srgbClr val="0070C0"/>
+            </a:solidFill>
+          </a:ln>
+          <a:effectLst/>
+        </p:spPr>
+        <p:style>
+          <a:lnRef idx="1">
+            <a:schemeClr val="accent1"/>
+          </a:lnRef>
+          <a:fillRef idx="2">
+            <a:schemeClr val="accent1"/>
+          </a:fillRef>
+          <a:effectRef idx="1">
+            <a:schemeClr val="accent1"/>
+          </a:effectRef>
+          <a:fontRef idx="minor">
+            <a:schemeClr val="dk1"/>
+          </a:fontRef>
+        </p:style>
+        <p:txBody>
+          <a:bodyPr rtlCol="0" anchor="ctr"/>
+          <a:lstStyle/>
+          <a:p>
+            <a:pPr algn="ctr"/>
+            <a:r>
+              <a:rPr lang="en-US" sz="900" b="1" dirty="0" err="1" smtClean="0">
+                <a:solidFill>
+                  <a:srgbClr val="0070C0"/>
+                </a:solidFill>
+              </a:rPr>
+              <a:t>EditEventCommand</a:t>
+            </a:r>
+            <a:endParaRPr lang="en-SG" sz="900" b="1" dirty="0">
+              <a:solidFill>
+                <a:srgbClr val="0070C0"/>
+              </a:solidFill>
+            </a:endParaRPr>
+          </a:p>
+        </p:txBody>
+      </p:sp>
+      <p:sp>
+        <p:nvSpPr>
+          <p:cNvPr id="105" name="Isosceles Triangle 102"/>
+          <p:cNvSpPr/>
+          <p:nvPr/>
+        </p:nvSpPr>
+        <p:spPr>
+          <a:xfrm rot="5400000" flipV="1">
+            <a:off x="5134110" y="2714491"/>
+            <a:ext cx="270504" cy="175523"/>
+          </a:xfrm>
+          <a:prstGeom prst="triangle">
+            <a:avLst/>
+          </a:prstGeom>
+          <a:ln w="19050">
+            <a:solidFill>
+              <a:srgbClr val="0070C0"/>
+            </a:solidFill>
+          </a:ln>
+          <a:effectLst/>
+        </p:spPr>
+        <p:style>
+          <a:lnRef idx="1">
+            <a:schemeClr val="accent1"/>
+          </a:lnRef>
+          <a:fillRef idx="2">
+            <a:schemeClr val="accent1"/>
+          </a:fillRef>
+          <a:effectRef idx="1">
+            <a:schemeClr val="accent1"/>
+          </a:effectRef>
+          <a:fontRef idx="minor">
+            <a:schemeClr val="dk1"/>
+          </a:fontRef>
+        </p:style>
+        <p:txBody>
+          <a:bodyPr rtlCol="0" anchor="ctr"/>
+          <a:lstStyle/>
+          <a:p>
+            <a:pPr algn="ctr"/>
+            <a:endParaRPr lang="en-SG" sz="1050" b="1">
+              <a:solidFill>
+                <a:srgbClr val="92D050"/>
+              </a:solidFill>
+            </a:endParaRPr>
+          </a:p>
+        </p:txBody>
+      </p:sp>
+      <p:sp>
+        <p:nvSpPr>
+          <p:cNvPr id="106" name="Rectangle 11"/>
+          <p:cNvSpPr/>
+          <p:nvPr/>
+        </p:nvSpPr>
+        <p:spPr>
+          <a:xfrm flipH="1">
+            <a:off x="5820675" y="2396440"/>
+            <a:ext cx="1343602" cy="270560"/>
+          </a:xfrm>
+          <a:prstGeom prst="rect">
+            <a:avLst/>
+          </a:prstGeom>
+          <a:ln w="19050">
+            <a:solidFill>
+              <a:srgbClr val="0070C0"/>
+            </a:solidFill>
+          </a:ln>
+          <a:effectLst/>
+        </p:spPr>
+        <p:style>
+          <a:lnRef idx="1">
+            <a:schemeClr val="accent1"/>
+          </a:lnRef>
+          <a:fillRef idx="2">
+            <a:schemeClr val="accent1"/>
+          </a:fillRef>
+          <a:effectRef idx="1">
+            <a:schemeClr val="accent1"/>
+          </a:effectRef>
+          <a:fontRef idx="minor">
+            <a:schemeClr val="dk1"/>
+          </a:fontRef>
+        </p:style>
+        <p:txBody>
+          <a:bodyPr rtlCol="0" anchor="ctr"/>
+          <a:lstStyle/>
+          <a:p>
+            <a:pPr algn="ctr"/>
+            <a:r>
+              <a:rPr lang="en-US" sz="900" b="1" dirty="0" err="1" smtClean="0">
+                <a:solidFill>
+                  <a:srgbClr val="0070C0"/>
+                </a:solidFill>
+              </a:rPr>
+              <a:t>SaveCommand</a:t>
+            </a:r>
+            <a:endParaRPr lang="en-SG" sz="900" b="1" dirty="0">
+              <a:solidFill>
+                <a:srgbClr val="0070C0"/>
+              </a:solidFill>
+            </a:endParaRPr>
+          </a:p>
+        </p:txBody>
+      </p:sp>
+      <p:sp>
+        <p:nvSpPr>
+          <p:cNvPr id="107" name="Rectangle 106"/>
+          <p:cNvSpPr/>
+          <p:nvPr/>
+        </p:nvSpPr>
+        <p:spPr>
+          <a:xfrm flipH="1">
+            <a:off x="5820673" y="3082240"/>
+            <a:ext cx="1343602" cy="270560"/>
+          </a:xfrm>
+          <a:prstGeom prst="rect">
+            <a:avLst/>
+          </a:prstGeom>
+          <a:ln w="19050">
+            <a:solidFill>
+              <a:srgbClr val="0070C0"/>
+            </a:solidFill>
+          </a:ln>
+          <a:effectLst/>
+        </p:spPr>
+        <p:style>
+          <a:lnRef idx="1">
+            <a:schemeClr val="accent1"/>
+          </a:lnRef>
+          <a:fillRef idx="2">
+            <a:schemeClr val="accent1"/>
+          </a:fillRef>
+          <a:effectRef idx="1">
+            <a:schemeClr val="accent1"/>
+          </a:effectRef>
+          <a:fontRef idx="minor">
+            <a:schemeClr val="dk1"/>
+          </a:fontRef>
+        </p:style>
+        <p:txBody>
+          <a:bodyPr rtlCol="0" anchor="ctr"/>
+          <a:lstStyle/>
+          <a:p>
+            <a:pPr algn="ctr"/>
+            <a:r>
+              <a:rPr lang="en-US" sz="900" b="1" dirty="0" err="1" smtClean="0">
+                <a:solidFill>
+                  <a:srgbClr val="0070C0"/>
+                </a:solidFill>
+              </a:rPr>
+              <a:t>DeleteEventCommand</a:t>
+            </a:r>
+            <a:endParaRPr lang="en-SG" sz="900" b="1" dirty="0">
+              <a:solidFill>
+                <a:srgbClr val="0070C0"/>
+              </a:solidFill>
+            </a:endParaRPr>
+          </a:p>
+        </p:txBody>
+      </p:sp>
+      <p:cxnSp>
+        <p:nvCxnSpPr>
+          <p:cNvPr id="108" name="Elbow Connector 63"/>
+          <p:cNvCxnSpPr>
+            <a:stCxn id="104" idx="3"/>
+            <a:endCxn id="105" idx="3"/>
+          </p:cNvCxnSpPr>
+          <p:nvPr/>
+        </p:nvCxnSpPr>
+        <p:spPr>
+          <a:xfrm rot="10800000" flipV="1">
+            <a:off x="5357125" y="2192679"/>
+            <a:ext cx="463551" cy="609573"/>
+          </a:xfrm>
+          <a:prstGeom prst="bentConnector3">
+            <a:avLst>
+              <a:gd name="adj1" fmla="val 50000"/>
+            </a:avLst>
+          </a:prstGeom>
+          <a:ln w="19050">
+            <a:solidFill>
+              <a:srgbClr val="0070C0"/>
+            </a:solidFill>
+            <a:headEnd type="none" w="med" len="med"/>
+            <a:tailEnd type="none" w="med" len="med"/>
+          </a:ln>
+          <a:effectLst/>
+        </p:spPr>
+        <p:style>
+          <a:lnRef idx="1">
+            <a:schemeClr val="accent2"/>
+          </a:lnRef>
+          <a:fillRef idx="2">
+            <a:schemeClr val="accent2"/>
+          </a:fillRef>
+          <a:effectRef idx="1">
+            <a:schemeClr val="accent2"/>
+          </a:effectRef>
+          <a:fontRef idx="minor">
+            <a:schemeClr val="dk1"/>
+          </a:fontRef>
+        </p:style>
+      </p:cxnSp>
+      <p:cxnSp>
+        <p:nvCxnSpPr>
+          <p:cNvPr id="109" name="Elbow Connector 63"/>
+          <p:cNvCxnSpPr>
+            <a:stCxn id="105" idx="3"/>
+            <a:endCxn id="107" idx="3"/>
+          </p:cNvCxnSpPr>
+          <p:nvPr/>
+        </p:nvCxnSpPr>
+        <p:spPr>
+          <a:xfrm>
+            <a:off x="5357124" y="2802253"/>
+            <a:ext cx="463549" cy="415267"/>
+          </a:xfrm>
+          <a:prstGeom prst="bentConnector3">
+            <a:avLst>
+              <a:gd name="adj1" fmla="val 50000"/>
+            </a:avLst>
+          </a:prstGeom>
+          <a:ln w="19050">
+            <a:solidFill>
+              <a:srgbClr val="0070C0"/>
+            </a:solidFill>
+            <a:headEnd type="none" w="med" len="med"/>
+            <a:tailEnd type="none" w="med" len="med"/>
+          </a:ln>
+          <a:effectLst/>
+        </p:spPr>
+        <p:style>
+          <a:lnRef idx="1">
+            <a:schemeClr val="accent2"/>
+          </a:lnRef>
+          <a:fillRef idx="2">
+            <a:schemeClr val="accent2"/>
+          </a:fillRef>
+          <a:effectRef idx="1">
+            <a:schemeClr val="accent2"/>
+          </a:effectRef>
+          <a:fontRef idx="minor">
+            <a:schemeClr val="dk1"/>
+          </a:fontRef>
+        </p:style>
+      </p:cxnSp>
+      <p:cxnSp>
+        <p:nvCxnSpPr>
+          <p:cNvPr id="110" name="Elbow Connector 63"/>
+          <p:cNvCxnSpPr>
+            <a:stCxn id="105" idx="3"/>
+            <a:endCxn id="106" idx="3"/>
+          </p:cNvCxnSpPr>
+          <p:nvPr/>
+        </p:nvCxnSpPr>
+        <p:spPr>
+          <a:xfrm flipV="1">
+            <a:off x="5357124" y="2531720"/>
+            <a:ext cx="463551" cy="270533"/>
+          </a:xfrm>
+          <a:prstGeom prst="bentConnector3">
+            <a:avLst>
+              <a:gd name="adj1" fmla="val 50000"/>
+            </a:avLst>
+          </a:prstGeom>
+          <a:ln w="19050">
+            <a:solidFill>
+              <a:srgbClr val="0070C0"/>
+            </a:solidFill>
+            <a:headEnd type="none" w="med" len="med"/>
+            <a:tailEnd type="none" w="med" len="med"/>
+          </a:ln>
+          <a:effectLst/>
+        </p:spPr>
+        <p:style>
+          <a:lnRef idx="1">
+            <a:schemeClr val="accent2"/>
+          </a:lnRef>
+          <a:fillRef idx="2">
+            <a:schemeClr val="accent2"/>
+          </a:fillRef>
+          <a:effectRef idx="1">
+            <a:schemeClr val="accent2"/>
+          </a:effectRef>
+          <a:fontRef idx="minor">
+            <a:schemeClr val="dk1"/>
+          </a:fontRef>
+        </p:style>
+      </p:cxnSp>
+      <p:sp>
+        <p:nvSpPr>
+          <p:cNvPr id="111" name="Rectangle 11"/>
+          <p:cNvSpPr/>
+          <p:nvPr/>
+        </p:nvSpPr>
+        <p:spPr>
+          <a:xfrm flipH="1">
+            <a:off x="5825473" y="2743200"/>
+            <a:ext cx="1343602" cy="270560"/>
+          </a:xfrm>
+          <a:prstGeom prst="rect">
+            <a:avLst/>
+          </a:prstGeom>
+          <a:ln w="19050">
+            <a:solidFill>
+              <a:srgbClr val="0070C0"/>
+            </a:solidFill>
+          </a:ln>
+          <a:effectLst/>
+        </p:spPr>
+        <p:style>
+          <a:lnRef idx="1">
+            <a:schemeClr val="accent1"/>
+          </a:lnRef>
+          <a:fillRef idx="2">
+            <a:schemeClr val="accent1"/>
+          </a:fillRef>
+          <a:effectRef idx="1">
+            <a:schemeClr val="accent1"/>
+          </a:effectRef>
+          <a:fontRef idx="minor">
+            <a:schemeClr val="dk1"/>
+          </a:fontRef>
+        </p:style>
+        <p:txBody>
+          <a:bodyPr rtlCol="0" anchor="ctr"/>
+          <a:lstStyle/>
+          <a:p>
+            <a:pPr algn="ctr"/>
+            <a:r>
+              <a:rPr lang="en-US" sz="900" b="1" dirty="0" err="1" smtClean="0">
+                <a:solidFill>
+                  <a:srgbClr val="0070C0"/>
+                </a:solidFill>
+              </a:rPr>
+              <a:t>DeleteTaskCommand</a:t>
+            </a:r>
+            <a:endParaRPr lang="en-SG" sz="900" b="1" dirty="0">
+              <a:solidFill>
+                <a:srgbClr val="0070C0"/>
+              </a:solidFill>
+            </a:endParaRPr>
+          </a:p>
+        </p:txBody>
+      </p:sp>
+      <p:cxnSp>
+        <p:nvCxnSpPr>
+          <p:cNvPr id="112" name="Elbow Connector 63"/>
+          <p:cNvCxnSpPr>
+            <a:stCxn id="105" idx="3"/>
+            <a:endCxn id="111" idx="3"/>
+          </p:cNvCxnSpPr>
+          <p:nvPr/>
+        </p:nvCxnSpPr>
+        <p:spPr>
+          <a:xfrm>
+            <a:off x="5357124" y="2802253"/>
+            <a:ext cx="468349" cy="76227"/>
+          </a:xfrm>
+          <a:prstGeom prst="bentConnector3">
+            <a:avLst>
+              <a:gd name="adj1" fmla="val 50000"/>
+            </a:avLst>
+          </a:prstGeom>
+          <a:ln w="19050">
+            <a:solidFill>
+              <a:srgbClr val="0070C0"/>
+            </a:solidFill>
+            <a:headEnd type="none" w="med" len="med"/>
+            <a:tailEnd type="none" w="med" len="med"/>
+          </a:ln>
+          <a:effectLst/>
+        </p:spPr>
+        <p:style>
+          <a:lnRef idx="1">
+            <a:schemeClr val="accent2"/>
+          </a:lnRef>
+          <a:fillRef idx="2">
+            <a:schemeClr val="accent2"/>
+          </a:fillRef>
+          <a:effectRef idx="1">
+            <a:schemeClr val="accent2"/>
+          </a:effectRef>
+          <a:fontRef idx="minor">
+            <a:schemeClr val="dk1"/>
+          </a:fontRef>
+        </p:style>
+      </p:cxnSp>
+      <p:sp>
+        <p:nvSpPr>
+          <p:cNvPr id="113" name="Rectangle 11"/>
+          <p:cNvSpPr/>
+          <p:nvPr/>
+        </p:nvSpPr>
+        <p:spPr>
+          <a:xfrm flipH="1">
+            <a:off x="5823996" y="1752600"/>
+            <a:ext cx="1343602" cy="228600"/>
+          </a:xfrm>
+          <a:prstGeom prst="rect">
+            <a:avLst/>
+          </a:prstGeom>
+          <a:ln w="19050">
+            <a:solidFill>
+              <a:srgbClr val="0070C0"/>
+            </a:solidFill>
+          </a:ln>
+          <a:effectLst/>
+        </p:spPr>
+        <p:style>
+          <a:lnRef idx="1">
+            <a:schemeClr val="accent1"/>
+          </a:lnRef>
+          <a:fillRef idx="2">
+            <a:schemeClr val="accent1"/>
+          </a:fillRef>
+          <a:effectRef idx="1">
+            <a:schemeClr val="accent1"/>
+          </a:effectRef>
+          <a:fontRef idx="minor">
+            <a:schemeClr val="dk1"/>
+          </a:fontRef>
+        </p:style>
+        <p:txBody>
+          <a:bodyPr rtlCol="0" anchor="ctr"/>
+          <a:lstStyle/>
+          <a:p>
+            <a:pPr algn="ctr"/>
+            <a:r>
+              <a:rPr lang="en-US" sz="900" b="1" dirty="0" err="1" smtClean="0">
+                <a:solidFill>
+                  <a:srgbClr val="0070C0"/>
+                </a:solidFill>
+              </a:rPr>
+              <a:t>EditTaskCommand</a:t>
+            </a:r>
+            <a:endParaRPr lang="en-SG" sz="900" b="1" dirty="0">
+              <a:solidFill>
+                <a:srgbClr val="0070C0"/>
+              </a:solidFill>
+            </a:endParaRPr>
+          </a:p>
+        </p:txBody>
+      </p:sp>
+      <p:sp>
+        <p:nvSpPr>
+          <p:cNvPr id="114" name="Rectangle 11"/>
+          <p:cNvSpPr/>
+          <p:nvPr/>
+        </p:nvSpPr>
+        <p:spPr>
+          <a:xfrm flipH="1">
+            <a:off x="5820675" y="1412768"/>
+            <a:ext cx="1343602" cy="263632"/>
+          </a:xfrm>
+          <a:prstGeom prst="rect">
+            <a:avLst/>
+          </a:prstGeom>
+          <a:ln w="19050">
+            <a:solidFill>
+              <a:srgbClr val="0070C0"/>
+            </a:solidFill>
+          </a:ln>
+          <a:effectLst/>
+        </p:spPr>
+        <p:style>
+          <a:lnRef idx="1">
+            <a:schemeClr val="accent1"/>
+          </a:lnRef>
+          <a:fillRef idx="2">
+            <a:schemeClr val="accent1"/>
+          </a:fillRef>
+          <a:effectRef idx="1">
+            <a:schemeClr val="accent1"/>
+          </a:effectRef>
+          <a:fontRef idx="minor">
+            <a:schemeClr val="dk1"/>
+          </a:fontRef>
+        </p:style>
+        <p:txBody>
+          <a:bodyPr rtlCol="0" anchor="ctr"/>
+          <a:lstStyle/>
+          <a:p>
+            <a:pPr algn="ctr"/>
+            <a:r>
+              <a:rPr lang="en-US" sz="900" b="1" dirty="0" err="1" smtClean="0">
+                <a:solidFill>
+                  <a:srgbClr val="0070C0"/>
+                </a:solidFill>
+              </a:rPr>
+              <a:t>AddEventCommand</a:t>
+            </a:r>
+            <a:endParaRPr lang="en-SG" sz="900" b="1" dirty="0">
+              <a:solidFill>
+                <a:srgbClr val="0070C0"/>
+              </a:solidFill>
+            </a:endParaRPr>
+          </a:p>
+        </p:txBody>
+      </p:sp>
+      <p:sp>
+        <p:nvSpPr>
+          <p:cNvPr id="115" name="Rectangle 114"/>
+          <p:cNvSpPr/>
+          <p:nvPr/>
+        </p:nvSpPr>
+        <p:spPr>
+          <a:xfrm flipH="1">
+            <a:off x="5819196" y="3733800"/>
+            <a:ext cx="1343602" cy="228600"/>
+          </a:xfrm>
+          <a:prstGeom prst="rect">
+            <a:avLst/>
+          </a:prstGeom>
+          <a:ln w="19050">
+            <a:solidFill>
+              <a:srgbClr val="0070C0"/>
+            </a:solidFill>
+          </a:ln>
+          <a:effectLst/>
+        </p:spPr>
+        <p:style>
+          <a:lnRef idx="1">
+            <a:schemeClr val="accent1"/>
+          </a:lnRef>
+          <a:fillRef idx="2">
+            <a:schemeClr val="accent1"/>
+          </a:fillRef>
+          <a:effectRef idx="1">
+            <a:schemeClr val="accent1"/>
+          </a:effectRef>
+          <a:fontRef idx="minor">
+            <a:schemeClr val="dk1"/>
+          </a:fontRef>
+        </p:style>
+        <p:txBody>
+          <a:bodyPr rtlCol="0" anchor="ctr"/>
+          <a:lstStyle/>
+          <a:p>
+            <a:pPr algn="ctr"/>
+            <a:r>
+              <a:rPr lang="en-US" sz="900" b="1" dirty="0" err="1" smtClean="0">
+                <a:solidFill>
+                  <a:srgbClr val="0070C0"/>
+                </a:solidFill>
+              </a:rPr>
+              <a:t>ListTaskCommand</a:t>
+            </a:r>
+            <a:endParaRPr lang="en-SG" sz="900" b="1" dirty="0">
+              <a:solidFill>
+                <a:srgbClr val="0070C0"/>
+              </a:solidFill>
+            </a:endParaRPr>
+          </a:p>
+        </p:txBody>
+      </p:sp>
+      <p:sp>
+        <p:nvSpPr>
+          <p:cNvPr id="116" name="Rectangle 11"/>
+          <p:cNvSpPr/>
+          <p:nvPr/>
+        </p:nvSpPr>
+        <p:spPr>
+          <a:xfrm flipH="1">
+            <a:off x="5823996" y="3429000"/>
+            <a:ext cx="1343602" cy="228600"/>
+          </a:xfrm>
+          <a:prstGeom prst="rect">
+            <a:avLst/>
+          </a:prstGeom>
+          <a:ln w="19050">
+            <a:solidFill>
+              <a:srgbClr val="0070C0"/>
+            </a:solidFill>
+          </a:ln>
+          <a:effectLst/>
+        </p:spPr>
+        <p:style>
+          <a:lnRef idx="1">
+            <a:schemeClr val="accent1"/>
+          </a:lnRef>
+          <a:fillRef idx="2">
+            <a:schemeClr val="accent1"/>
+          </a:fillRef>
+          <a:effectRef idx="1">
+            <a:schemeClr val="accent1"/>
+          </a:effectRef>
+          <a:fontRef idx="minor">
+            <a:schemeClr val="dk1"/>
+          </a:fontRef>
+        </p:style>
+        <p:txBody>
+          <a:bodyPr rtlCol="0" anchor="ctr"/>
+          <a:lstStyle/>
+          <a:p>
+            <a:pPr algn="ctr"/>
+            <a:r>
+              <a:rPr lang="en-US" sz="900" b="1" dirty="0" err="1" smtClean="0">
+                <a:solidFill>
+                  <a:srgbClr val="0070C0"/>
+                </a:solidFill>
+              </a:rPr>
+              <a:t>UndoCommand</a:t>
+            </a:r>
+            <a:endParaRPr lang="en-SG" sz="900" b="1" dirty="0">
+              <a:solidFill>
+                <a:srgbClr val="0070C0"/>
+              </a:solidFill>
+            </a:endParaRPr>
+          </a:p>
+        </p:txBody>
+      </p:sp>
+      <p:cxnSp>
+        <p:nvCxnSpPr>
+          <p:cNvPr id="117" name="Elbow Connector 116"/>
+          <p:cNvCxnSpPr>
+            <a:stCxn id="128" idx="3"/>
+            <a:endCxn id="105" idx="3"/>
+          </p:cNvCxnSpPr>
+          <p:nvPr/>
+        </p:nvCxnSpPr>
+        <p:spPr>
+          <a:xfrm rot="10800000" flipV="1">
+            <a:off x="5357124" y="1239783"/>
+            <a:ext cx="462074" cy="1562469"/>
+          </a:xfrm>
+          <a:prstGeom prst="bentConnector3">
+            <a:avLst>
+              <a:gd name="adj1" fmla="val 50000"/>
+            </a:avLst>
+          </a:prstGeom>
+          <a:ln w="19050">
+            <a:solidFill>
+              <a:srgbClr val="0070C0"/>
+            </a:solidFill>
+            <a:headEnd type="none" w="med" len="med"/>
+            <a:tailEnd type="none" w="med" len="med"/>
+          </a:ln>
+          <a:effectLst/>
+        </p:spPr>
+        <p:style>
+          <a:lnRef idx="1">
+            <a:schemeClr val="accent2"/>
+          </a:lnRef>
+          <a:fillRef idx="2">
+            <a:schemeClr val="accent2"/>
+          </a:fillRef>
+          <a:effectRef idx="1">
+            <a:schemeClr val="accent2"/>
+          </a:effectRef>
+          <a:fontRef idx="minor">
+            <a:schemeClr val="dk1"/>
+          </a:fontRef>
+        </p:style>
+      </p:cxnSp>
+      <p:sp>
+        <p:nvSpPr>
+          <p:cNvPr id="118" name="Rectangle 117"/>
+          <p:cNvSpPr/>
+          <p:nvPr/>
+        </p:nvSpPr>
+        <p:spPr>
+          <a:xfrm flipH="1">
+            <a:off x="5823997" y="4038600"/>
+            <a:ext cx="1343602" cy="228600"/>
+          </a:xfrm>
+          <a:prstGeom prst="rect">
+            <a:avLst/>
+          </a:prstGeom>
+          <a:ln w="19050">
+            <a:solidFill>
+              <a:srgbClr val="0070C0"/>
+            </a:solidFill>
+          </a:ln>
+          <a:effectLst/>
+        </p:spPr>
+        <p:style>
+          <a:lnRef idx="1">
+            <a:schemeClr val="accent1"/>
+          </a:lnRef>
+          <a:fillRef idx="2">
+            <a:schemeClr val="accent1"/>
+          </a:fillRef>
+          <a:effectRef idx="1">
+            <a:schemeClr val="accent1"/>
+          </a:effectRef>
+          <a:fontRef idx="minor">
+            <a:schemeClr val="dk1"/>
+          </a:fontRef>
+        </p:style>
+        <p:txBody>
+          <a:bodyPr rtlCol="0" anchor="ctr"/>
+          <a:lstStyle/>
+          <a:p>
+            <a:pPr algn="ctr"/>
+            <a:r>
+              <a:rPr lang="en-US" sz="900" b="1" dirty="0" err="1" smtClean="0">
+                <a:solidFill>
+                  <a:srgbClr val="0070C0"/>
+                </a:solidFill>
+              </a:rPr>
+              <a:t>ListEventCommand</a:t>
+            </a:r>
+            <a:endParaRPr lang="en-SG" sz="900" b="1" dirty="0">
+              <a:solidFill>
+                <a:srgbClr val="0070C0"/>
+              </a:solidFill>
+            </a:endParaRPr>
+          </a:p>
+        </p:txBody>
+      </p:sp>
+      <p:cxnSp>
+        <p:nvCxnSpPr>
+          <p:cNvPr id="119" name="Elbow Connector 118"/>
+          <p:cNvCxnSpPr>
+            <a:stCxn id="105" idx="3"/>
+            <a:endCxn id="118" idx="3"/>
+          </p:cNvCxnSpPr>
+          <p:nvPr/>
+        </p:nvCxnSpPr>
+        <p:spPr>
+          <a:xfrm>
+            <a:off x="5357124" y="2802253"/>
+            <a:ext cx="466873" cy="1350647"/>
+          </a:xfrm>
+          <a:prstGeom prst="bentConnector3">
+            <a:avLst>
+              <a:gd name="adj1" fmla="val 50000"/>
+            </a:avLst>
+          </a:prstGeom>
+          <a:ln w="19050">
+            <a:solidFill>
+              <a:srgbClr val="0070C0"/>
+            </a:solidFill>
+            <a:headEnd type="none" w="med" len="med"/>
+            <a:tailEnd type="none" w="med" len="med"/>
+          </a:ln>
+          <a:effectLst/>
+        </p:spPr>
+        <p:style>
+          <a:lnRef idx="1">
+            <a:schemeClr val="accent2"/>
+          </a:lnRef>
+          <a:fillRef idx="2">
+            <a:schemeClr val="accent2"/>
+          </a:fillRef>
+          <a:effectRef idx="1">
+            <a:schemeClr val="accent2"/>
+          </a:effectRef>
+          <a:fontRef idx="minor">
+            <a:schemeClr val="dk1"/>
+          </a:fontRef>
+        </p:style>
+      </p:cxnSp>
+      <p:cxnSp>
+        <p:nvCxnSpPr>
+          <p:cNvPr id="120" name="Elbow Connector 119"/>
+          <p:cNvCxnSpPr>
+            <a:stCxn id="105" idx="3"/>
+            <a:endCxn id="114" idx="3"/>
+          </p:cNvCxnSpPr>
+          <p:nvPr/>
+        </p:nvCxnSpPr>
+        <p:spPr>
+          <a:xfrm flipV="1">
+            <a:off x="5357124" y="1544584"/>
+            <a:ext cx="463551" cy="1257669"/>
+          </a:xfrm>
+          <a:prstGeom prst="bentConnector3">
+            <a:avLst/>
+          </a:prstGeom>
+          <a:ln w="19050">
+            <a:solidFill>
+              <a:srgbClr val="0070C0"/>
+            </a:solidFill>
+            <a:headEnd type="none" w="med" len="med"/>
+            <a:tailEnd type="none" w="med" len="med"/>
+          </a:ln>
+          <a:effectLst/>
+        </p:spPr>
+        <p:style>
+          <a:lnRef idx="1">
+            <a:schemeClr val="accent2"/>
+          </a:lnRef>
+          <a:fillRef idx="2">
+            <a:schemeClr val="accent2"/>
+          </a:fillRef>
+          <a:effectRef idx="1">
+            <a:schemeClr val="accent2"/>
+          </a:effectRef>
+          <a:fontRef idx="minor">
+            <a:schemeClr val="dk1"/>
+          </a:fontRef>
+        </p:style>
+      </p:cxnSp>
+      <p:cxnSp>
+        <p:nvCxnSpPr>
+          <p:cNvPr id="121" name="Elbow Connector 120"/>
+          <p:cNvCxnSpPr>
+            <a:stCxn id="105" idx="3"/>
+            <a:endCxn id="113" idx="3"/>
+          </p:cNvCxnSpPr>
+          <p:nvPr/>
+        </p:nvCxnSpPr>
+        <p:spPr>
+          <a:xfrm flipV="1">
+            <a:off x="5357124" y="1866900"/>
+            <a:ext cx="466872" cy="935353"/>
+          </a:xfrm>
+          <a:prstGeom prst="bentConnector3">
+            <a:avLst>
+              <a:gd name="adj1" fmla="val 50000"/>
+            </a:avLst>
+          </a:prstGeom>
+          <a:ln w="19050">
+            <a:solidFill>
+              <a:srgbClr val="0070C0"/>
+            </a:solidFill>
+            <a:headEnd type="none" w="med" len="med"/>
+            <a:tailEnd type="none" w="med" len="med"/>
+          </a:ln>
+          <a:effectLst/>
+        </p:spPr>
+        <p:style>
+          <a:lnRef idx="1">
+            <a:schemeClr val="accent2"/>
+          </a:lnRef>
+          <a:fillRef idx="2">
+            <a:schemeClr val="accent2"/>
+          </a:fillRef>
+          <a:effectRef idx="1">
+            <a:schemeClr val="accent2"/>
+          </a:effectRef>
+          <a:fontRef idx="minor">
+            <a:schemeClr val="dk1"/>
+          </a:fontRef>
+        </p:style>
+      </p:cxnSp>
+      <p:cxnSp>
+        <p:nvCxnSpPr>
+          <p:cNvPr id="122" name="Elbow Connector 121"/>
+          <p:cNvCxnSpPr>
+            <a:stCxn id="105" idx="3"/>
+            <a:endCxn id="115" idx="3"/>
+          </p:cNvCxnSpPr>
+          <p:nvPr/>
+        </p:nvCxnSpPr>
+        <p:spPr>
+          <a:xfrm>
+            <a:off x="5357124" y="2802253"/>
+            <a:ext cx="462072" cy="1045847"/>
+          </a:xfrm>
+          <a:prstGeom prst="bentConnector3">
+            <a:avLst/>
+          </a:prstGeom>
+          <a:ln w="19050">
+            <a:solidFill>
+              <a:srgbClr val="0070C0"/>
+            </a:solidFill>
+            <a:headEnd type="none" w="med" len="med"/>
+            <a:tailEnd type="none" w="med" len="med"/>
+          </a:ln>
+          <a:effectLst/>
+        </p:spPr>
+        <p:style>
+          <a:lnRef idx="1">
+            <a:schemeClr val="accent2"/>
+          </a:lnRef>
+          <a:fillRef idx="2">
+            <a:schemeClr val="accent2"/>
+          </a:fillRef>
+          <a:effectRef idx="1">
+            <a:schemeClr val="accent2"/>
+          </a:effectRef>
+          <a:fontRef idx="minor">
+            <a:schemeClr val="dk1"/>
+          </a:fontRef>
+        </p:style>
+      </p:cxnSp>
+      <p:cxnSp>
+        <p:nvCxnSpPr>
+          <p:cNvPr id="123" name="Elbow Connector 122"/>
+          <p:cNvCxnSpPr>
+            <a:stCxn id="116" idx="3"/>
+            <a:endCxn id="105" idx="3"/>
+          </p:cNvCxnSpPr>
+          <p:nvPr/>
+        </p:nvCxnSpPr>
+        <p:spPr>
+          <a:xfrm rot="10800000">
+            <a:off x="5357124" y="2802254"/>
+            <a:ext cx="466872" cy="741047"/>
+          </a:xfrm>
+          <a:prstGeom prst="bentConnector3">
+            <a:avLst>
+              <a:gd name="adj1" fmla="val 50000"/>
+            </a:avLst>
+          </a:prstGeom>
+          <a:ln w="19050">
+            <a:solidFill>
+              <a:srgbClr val="0070C0"/>
+            </a:solidFill>
+            <a:headEnd type="none" w="med" len="med"/>
+            <a:tailEnd type="none" w="med" len="med"/>
+          </a:ln>
+          <a:effectLst/>
+        </p:spPr>
+        <p:style>
+          <a:lnRef idx="1">
+            <a:schemeClr val="accent2"/>
+          </a:lnRef>
+          <a:fillRef idx="2">
+            <a:schemeClr val="accent2"/>
+          </a:fillRef>
+          <a:effectRef idx="1">
+            <a:schemeClr val="accent2"/>
+          </a:effectRef>
+          <a:fontRef idx="minor">
+            <a:schemeClr val="dk1"/>
+          </a:fontRef>
+        </p:style>
+      </p:cxnSp>
+      <p:sp>
+        <p:nvSpPr>
+          <p:cNvPr id="124" name="Rectangle 123"/>
+          <p:cNvSpPr/>
+          <p:nvPr/>
+        </p:nvSpPr>
+        <p:spPr>
+          <a:xfrm flipH="1">
+            <a:off x="5814396" y="4648200"/>
+            <a:ext cx="1343602" cy="228600"/>
+          </a:xfrm>
+          <a:prstGeom prst="rect">
+            <a:avLst/>
+          </a:prstGeom>
+          <a:ln w="19050">
+            <a:solidFill>
+              <a:srgbClr val="0070C0"/>
+            </a:solidFill>
+          </a:ln>
+          <a:effectLst/>
+        </p:spPr>
+        <p:style>
+          <a:lnRef idx="1">
+            <a:schemeClr val="accent1"/>
+          </a:lnRef>
+          <a:fillRef idx="2">
+            <a:schemeClr val="accent1"/>
+          </a:fillRef>
+          <a:effectRef idx="1">
+            <a:schemeClr val="accent1"/>
+          </a:effectRef>
+          <a:fontRef idx="minor">
+            <a:schemeClr val="dk1"/>
+          </a:fontRef>
+        </p:style>
+        <p:txBody>
+          <a:bodyPr rtlCol="0" anchor="ctr"/>
+          <a:lstStyle/>
+          <a:p>
+            <a:pPr algn="ctr"/>
+            <a:r>
+              <a:rPr lang="en-US" sz="900" b="1" dirty="0" err="1" smtClean="0">
+                <a:solidFill>
+                  <a:srgbClr val="0070C0"/>
+                </a:solidFill>
+              </a:rPr>
+              <a:t>MarkCommand</a:t>
+            </a:r>
+            <a:endParaRPr lang="en-SG" sz="900" b="1" dirty="0">
+              <a:solidFill>
+                <a:srgbClr val="0070C0"/>
+              </a:solidFill>
+            </a:endParaRPr>
+          </a:p>
+        </p:txBody>
+      </p:sp>
+      <p:sp>
+        <p:nvSpPr>
+          <p:cNvPr id="125" name="Rectangle 11"/>
+          <p:cNvSpPr/>
+          <p:nvPr/>
+        </p:nvSpPr>
+        <p:spPr>
+          <a:xfrm flipH="1">
+            <a:off x="5819196" y="4343400"/>
+            <a:ext cx="1343602" cy="228600"/>
+          </a:xfrm>
+          <a:prstGeom prst="rect">
+            <a:avLst/>
+          </a:prstGeom>
+          <a:ln w="19050">
+            <a:solidFill>
+              <a:srgbClr val="0070C0"/>
+            </a:solidFill>
+          </a:ln>
+          <a:effectLst/>
+        </p:spPr>
+        <p:style>
+          <a:lnRef idx="1">
+            <a:schemeClr val="accent1"/>
+          </a:lnRef>
+          <a:fillRef idx="2">
+            <a:schemeClr val="accent1"/>
+          </a:fillRef>
+          <a:effectRef idx="1">
+            <a:schemeClr val="accent1"/>
+          </a:effectRef>
+          <a:fontRef idx="minor">
+            <a:schemeClr val="dk1"/>
+          </a:fontRef>
+        </p:style>
+        <p:txBody>
+          <a:bodyPr rtlCol="0" anchor="ctr"/>
+          <a:lstStyle/>
+          <a:p>
+            <a:pPr algn="ctr"/>
+            <a:r>
+              <a:rPr lang="en-US" sz="900" b="1" dirty="0" err="1" smtClean="0">
+                <a:solidFill>
+                  <a:srgbClr val="0070C0"/>
+                </a:solidFill>
+              </a:rPr>
+              <a:t>HelpCommand</a:t>
+            </a:r>
+            <a:endParaRPr lang="en-SG" sz="900" b="1" dirty="0">
+              <a:solidFill>
+                <a:srgbClr val="0070C0"/>
+              </a:solidFill>
+            </a:endParaRPr>
+          </a:p>
+        </p:txBody>
+      </p:sp>
+      <p:sp>
+        <p:nvSpPr>
+          <p:cNvPr id="126" name="Rectangle 125"/>
+          <p:cNvSpPr/>
+          <p:nvPr/>
+        </p:nvSpPr>
+        <p:spPr>
+          <a:xfrm flipH="1">
+            <a:off x="5819197" y="4953000"/>
+            <a:ext cx="1343602" cy="228600"/>
+          </a:xfrm>
+          <a:prstGeom prst="rect">
+            <a:avLst/>
+          </a:prstGeom>
+          <a:ln w="19050">
+            <a:solidFill>
+              <a:srgbClr val="0070C0"/>
+            </a:solidFill>
+          </a:ln>
+          <a:effectLst/>
+        </p:spPr>
+        <p:style>
+          <a:lnRef idx="1">
+            <a:schemeClr val="accent1"/>
+          </a:lnRef>
+          <a:fillRef idx="2">
+            <a:schemeClr val="accent1"/>
+          </a:fillRef>
+          <a:effectRef idx="1">
+            <a:schemeClr val="accent1"/>
+          </a:effectRef>
+          <a:fontRef idx="minor">
+            <a:schemeClr val="dk1"/>
+          </a:fontRef>
+        </p:style>
+        <p:txBody>
+          <a:bodyPr rtlCol="0" anchor="ctr"/>
+          <a:lstStyle/>
+          <a:p>
+            <a:pPr algn="ctr"/>
+            <a:r>
+              <a:rPr lang="en-US" sz="900" b="1" dirty="0" err="1" smtClean="0">
+                <a:solidFill>
+                  <a:srgbClr val="0070C0"/>
+                </a:solidFill>
+              </a:rPr>
+              <a:t>SearchCommand</a:t>
+            </a:r>
+            <a:endParaRPr lang="en-SG" sz="900" b="1" dirty="0">
+              <a:solidFill>
+                <a:srgbClr val="0070C0"/>
+              </a:solidFill>
+            </a:endParaRPr>
+          </a:p>
+        </p:txBody>
+      </p:sp>
+      <p:sp>
+        <p:nvSpPr>
+          <p:cNvPr id="127" name="Rectangle 126"/>
+          <p:cNvSpPr/>
+          <p:nvPr/>
+        </p:nvSpPr>
+        <p:spPr>
+          <a:xfrm flipH="1">
+            <a:off x="5819198" y="5257800"/>
+            <a:ext cx="1343602" cy="228600"/>
+          </a:xfrm>
+          <a:prstGeom prst="rect">
+            <a:avLst/>
+          </a:prstGeom>
+          <a:ln w="19050">
+            <a:solidFill>
+              <a:srgbClr val="0070C0"/>
+            </a:solidFill>
+          </a:ln>
+          <a:effectLst/>
+        </p:spPr>
+        <p:style>
+          <a:lnRef idx="1">
+            <a:schemeClr val="accent1"/>
+          </a:lnRef>
+          <a:fillRef idx="2">
+            <a:schemeClr val="accent1"/>
+          </a:fillRef>
+          <a:effectRef idx="1">
+            <a:schemeClr val="accent1"/>
+          </a:effectRef>
+          <a:fontRef idx="minor">
+            <a:schemeClr val="dk1"/>
+          </a:fontRef>
+        </p:style>
+        <p:txBody>
+          <a:bodyPr rtlCol="0" anchor="ctr"/>
+          <a:lstStyle/>
+          <a:p>
+            <a:pPr algn="ctr"/>
+            <a:r>
+              <a:rPr lang="en-US" sz="900" b="1" dirty="0" err="1" smtClean="0">
+                <a:solidFill>
+                  <a:srgbClr val="0070C0"/>
+                </a:solidFill>
+              </a:rPr>
+              <a:t>ExitCommand</a:t>
+            </a:r>
+            <a:endParaRPr lang="en-SG" sz="900" b="1" dirty="0">
+              <a:solidFill>
+                <a:srgbClr val="0070C0"/>
+              </a:solidFill>
+            </a:endParaRPr>
+          </a:p>
+        </p:txBody>
+      </p:sp>
+      <p:sp>
+        <p:nvSpPr>
+          <p:cNvPr id="128" name="Rectangle 11"/>
+          <p:cNvSpPr/>
+          <p:nvPr/>
+        </p:nvSpPr>
+        <p:spPr>
+          <a:xfrm flipH="1">
+            <a:off x="5819198" y="1107968"/>
+            <a:ext cx="1343602" cy="263632"/>
+          </a:xfrm>
+          <a:prstGeom prst="rect">
+            <a:avLst/>
+          </a:prstGeom>
+          <a:ln w="19050">
+            <a:solidFill>
+              <a:srgbClr val="0070C0"/>
+            </a:solidFill>
+          </a:ln>
+          <a:effectLst/>
+        </p:spPr>
+        <p:style>
+          <a:lnRef idx="1">
+            <a:schemeClr val="accent1"/>
+          </a:lnRef>
+          <a:fillRef idx="2">
+            <a:schemeClr val="accent1"/>
+          </a:fillRef>
+          <a:effectRef idx="1">
+            <a:schemeClr val="accent1"/>
+          </a:effectRef>
+          <a:fontRef idx="minor">
+            <a:schemeClr val="dk1"/>
+          </a:fontRef>
+        </p:style>
+        <p:txBody>
+          <a:bodyPr rtlCol="0" anchor="ctr"/>
+          <a:lstStyle/>
+          <a:p>
+            <a:pPr algn="ctr"/>
+            <a:r>
+              <a:rPr lang="en-US" sz="900" b="1" dirty="0" err="1" smtClean="0">
+                <a:solidFill>
+                  <a:srgbClr val="0070C0"/>
+                </a:solidFill>
+              </a:rPr>
+              <a:t>AddTaskCommand</a:t>
+            </a:r>
+            <a:endParaRPr lang="en-SG" sz="900" b="1" dirty="0">
+              <a:solidFill>
+                <a:srgbClr val="0070C0"/>
+              </a:solidFill>
+            </a:endParaRPr>
+          </a:p>
+        </p:txBody>
+      </p:sp>
+      <p:cxnSp>
+        <p:nvCxnSpPr>
+          <p:cNvPr id="129" name="Elbow Connector 128"/>
+          <p:cNvCxnSpPr>
+            <a:stCxn id="105" idx="3"/>
+            <a:endCxn id="125" idx="3"/>
+          </p:cNvCxnSpPr>
+          <p:nvPr/>
+        </p:nvCxnSpPr>
+        <p:spPr>
+          <a:xfrm>
+            <a:off x="5357124" y="2802253"/>
+            <a:ext cx="462072" cy="1655447"/>
+          </a:xfrm>
+          <a:prstGeom prst="bentConnector3">
+            <a:avLst>
+              <a:gd name="adj1" fmla="val 50000"/>
+            </a:avLst>
+          </a:prstGeom>
+          <a:ln w="19050">
+            <a:solidFill>
+              <a:srgbClr val="0070C0"/>
+            </a:solidFill>
+            <a:headEnd type="none" w="med" len="med"/>
+            <a:tailEnd type="none" w="med" len="med"/>
+          </a:ln>
+          <a:effectLst/>
+        </p:spPr>
+        <p:style>
+          <a:lnRef idx="1">
+            <a:schemeClr val="accent2"/>
+          </a:lnRef>
+          <a:fillRef idx="2">
+            <a:schemeClr val="accent2"/>
+          </a:fillRef>
+          <a:effectRef idx="1">
+            <a:schemeClr val="accent2"/>
+          </a:effectRef>
+          <a:fontRef idx="minor">
+            <a:schemeClr val="dk1"/>
+          </a:fontRef>
+        </p:style>
+      </p:cxnSp>
+      <p:cxnSp>
+        <p:nvCxnSpPr>
+          <p:cNvPr id="130" name="Elbow Connector 129"/>
+          <p:cNvCxnSpPr>
+            <a:stCxn id="105" idx="3"/>
+            <a:endCxn id="124" idx="3"/>
+          </p:cNvCxnSpPr>
+          <p:nvPr/>
+        </p:nvCxnSpPr>
+        <p:spPr>
+          <a:xfrm>
+            <a:off x="5357124" y="2802253"/>
+            <a:ext cx="457272" cy="1960247"/>
+          </a:xfrm>
+          <a:prstGeom prst="bentConnector3">
+            <a:avLst>
+              <a:gd name="adj1" fmla="val 50000"/>
+            </a:avLst>
+          </a:prstGeom>
+          <a:ln w="19050">
+            <a:solidFill>
+              <a:srgbClr val="0070C0"/>
+            </a:solidFill>
+            <a:headEnd type="none" w="med" len="med"/>
+            <a:tailEnd type="none" w="med" len="med"/>
+          </a:ln>
+          <a:effectLst/>
+        </p:spPr>
+        <p:style>
+          <a:lnRef idx="1">
+            <a:schemeClr val="accent2"/>
+          </a:lnRef>
+          <a:fillRef idx="2">
+            <a:schemeClr val="accent2"/>
+          </a:fillRef>
+          <a:effectRef idx="1">
+            <a:schemeClr val="accent2"/>
+          </a:effectRef>
+          <a:fontRef idx="minor">
+            <a:schemeClr val="dk1"/>
+          </a:fontRef>
+        </p:style>
+      </p:cxnSp>
+      <p:cxnSp>
+        <p:nvCxnSpPr>
+          <p:cNvPr id="131" name="Elbow Connector 130"/>
+          <p:cNvCxnSpPr>
+            <a:stCxn id="105" idx="3"/>
+            <a:endCxn id="126" idx="3"/>
+          </p:cNvCxnSpPr>
+          <p:nvPr/>
+        </p:nvCxnSpPr>
+        <p:spPr>
+          <a:xfrm>
+            <a:off x="5357124" y="2802253"/>
+            <a:ext cx="462073" cy="2265047"/>
+          </a:xfrm>
+          <a:prstGeom prst="bentConnector3">
+            <a:avLst>
+              <a:gd name="adj1" fmla="val 50000"/>
+            </a:avLst>
+          </a:prstGeom>
+          <a:ln w="19050">
+            <a:solidFill>
+              <a:srgbClr val="0070C0"/>
+            </a:solidFill>
+            <a:headEnd type="none" w="med" len="med"/>
+            <a:tailEnd type="none" w="med" len="med"/>
+          </a:ln>
+          <a:effectLst/>
+        </p:spPr>
+        <p:style>
+          <a:lnRef idx="1">
+            <a:schemeClr val="accent2"/>
+          </a:lnRef>
+          <a:fillRef idx="2">
+            <a:schemeClr val="accent2"/>
+          </a:fillRef>
+          <a:effectRef idx="1">
+            <a:schemeClr val="accent2"/>
+          </a:effectRef>
+          <a:fontRef idx="minor">
+            <a:schemeClr val="dk1"/>
+          </a:fontRef>
+        </p:style>
+      </p:cxnSp>
+      <p:cxnSp>
+        <p:nvCxnSpPr>
+          <p:cNvPr id="132" name="Elbow Connector 131"/>
+          <p:cNvCxnSpPr>
+            <a:stCxn id="127" idx="3"/>
+            <a:endCxn id="105" idx="3"/>
+          </p:cNvCxnSpPr>
+          <p:nvPr/>
+        </p:nvCxnSpPr>
+        <p:spPr>
+          <a:xfrm rot="10800000">
+            <a:off x="5357124" y="2802254"/>
+            <a:ext cx="462074" cy="2569847"/>
+          </a:xfrm>
+          <a:prstGeom prst="bentConnector3">
+            <a:avLst>
+              <a:gd name="adj1" fmla="val 50000"/>
+            </a:avLst>
+          </a:prstGeom>
+          <a:ln w="19050">
+            <a:solidFill>
+              <a:srgbClr val="0070C0"/>
+            </a:solidFill>
+            <a:headEnd type="none" w="med" len="med"/>
+            <a:tailEnd type="none" w="med" len="med"/>
+          </a:ln>
+          <a:effectLst/>
+        </p:spPr>
+        <p:style>
+          <a:lnRef idx="1">
+            <a:schemeClr val="accent2"/>
+          </a:lnRef>
+          <a:fillRef idx="2">
+            <a:schemeClr val="accent2"/>
+          </a:fillRef>
+          <a:effectRef idx="1">
+            <a:schemeClr val="accent2"/>
+          </a:effectRef>
+          <a:fontRef idx="minor">
+            <a:schemeClr val="dk1"/>
+          </a:fontRef>
+        </p:style>
+      </p:cxnSp>
     </p:spTree>
     <p:extLst>
       <p:ext uri="{BB962C8B-B14F-4D97-AF65-F5344CB8AC3E}">

</xml_diff>

<commit_message>
Edited diagrams according to TK comments
</commit_message>
<xml_diff>
--- a/docs/diagrams/Diagrams.pptx
+++ b/docs/diagrams/Diagrams.pptx
@@ -215,7 +215,7 @@
           <a:p>
             <a:fld id="{F5CC4B3F-88C1-4FFA-B1B6-F41C21DC6924}" type="datetimeFigureOut">
               <a:rPr lang="en-US" smtClean="0"/>
-              <a:t>11/3/2016</a:t>
+              <a:t>11/6/2016</a:t>
             </a:fld>
             <a:endParaRPr lang="en-US"/>
           </a:p>
@@ -661,7 +661,7 @@
           <a:p>
             <a:fld id="{78C97017-6FC3-485B-9764-EAC9E56C1D49}" type="datetimeFigureOut">
               <a:rPr lang="en-US" smtClean="0"/>
-              <a:t>11/3/2016</a:t>
+              <a:t>11/6/2016</a:t>
             </a:fld>
             <a:endParaRPr lang="en-US"/>
           </a:p>
@@ -829,7 +829,7 @@
           <a:p>
             <a:fld id="{78C97017-6FC3-485B-9764-EAC9E56C1D49}" type="datetimeFigureOut">
               <a:rPr lang="en-US" smtClean="0"/>
-              <a:t>11/3/2016</a:t>
+              <a:t>11/6/2016</a:t>
             </a:fld>
             <a:endParaRPr lang="en-US"/>
           </a:p>
@@ -1007,7 +1007,7 @@
           <a:p>
             <a:fld id="{78C97017-6FC3-485B-9764-EAC9E56C1D49}" type="datetimeFigureOut">
               <a:rPr lang="en-US" smtClean="0"/>
-              <a:t>11/3/2016</a:t>
+              <a:t>11/6/2016</a:t>
             </a:fld>
             <a:endParaRPr lang="en-US"/>
           </a:p>
@@ -1175,7 +1175,7 @@
           <a:p>
             <a:fld id="{78C97017-6FC3-485B-9764-EAC9E56C1D49}" type="datetimeFigureOut">
               <a:rPr lang="en-US" smtClean="0"/>
-              <a:t>11/3/2016</a:t>
+              <a:t>11/6/2016</a:t>
             </a:fld>
             <a:endParaRPr lang="en-US"/>
           </a:p>
@@ -1420,7 +1420,7 @@
           <a:p>
             <a:fld id="{78C97017-6FC3-485B-9764-EAC9E56C1D49}" type="datetimeFigureOut">
               <a:rPr lang="en-US" smtClean="0"/>
-              <a:t>11/3/2016</a:t>
+              <a:t>11/6/2016</a:t>
             </a:fld>
             <a:endParaRPr lang="en-US"/>
           </a:p>
@@ -1705,7 +1705,7 @@
           <a:p>
             <a:fld id="{78C97017-6FC3-485B-9764-EAC9E56C1D49}" type="datetimeFigureOut">
               <a:rPr lang="en-US" smtClean="0"/>
-              <a:t>11/3/2016</a:t>
+              <a:t>11/6/2016</a:t>
             </a:fld>
             <a:endParaRPr lang="en-US"/>
           </a:p>
@@ -2124,7 +2124,7 @@
           <a:p>
             <a:fld id="{78C97017-6FC3-485B-9764-EAC9E56C1D49}" type="datetimeFigureOut">
               <a:rPr lang="en-US" smtClean="0"/>
-              <a:t>11/3/2016</a:t>
+              <a:t>11/6/2016</a:t>
             </a:fld>
             <a:endParaRPr lang="en-US"/>
           </a:p>
@@ -2241,7 +2241,7 @@
           <a:p>
             <a:fld id="{78C97017-6FC3-485B-9764-EAC9E56C1D49}" type="datetimeFigureOut">
               <a:rPr lang="en-US" smtClean="0"/>
-              <a:t>11/3/2016</a:t>
+              <a:t>11/6/2016</a:t>
             </a:fld>
             <a:endParaRPr lang="en-US"/>
           </a:p>
@@ -2336,7 +2336,7 @@
           <a:p>
             <a:fld id="{78C97017-6FC3-485B-9764-EAC9E56C1D49}" type="datetimeFigureOut">
               <a:rPr lang="en-US" smtClean="0"/>
-              <a:t>11/3/2016</a:t>
+              <a:t>11/6/2016</a:t>
             </a:fld>
             <a:endParaRPr lang="en-US"/>
           </a:p>
@@ -2611,7 +2611,7 @@
           <a:p>
             <a:fld id="{78C97017-6FC3-485B-9764-EAC9E56C1D49}" type="datetimeFigureOut">
               <a:rPr lang="en-US" smtClean="0"/>
-              <a:t>11/3/2016</a:t>
+              <a:t>11/6/2016</a:t>
             </a:fld>
             <a:endParaRPr lang="en-US"/>
           </a:p>
@@ -2863,7 +2863,7 @@
           <a:p>
             <a:fld id="{78C97017-6FC3-485B-9764-EAC9E56C1D49}" type="datetimeFigureOut">
               <a:rPr lang="en-US" smtClean="0"/>
-              <a:t>11/3/2016</a:t>
+              <a:t>11/6/2016</a:t>
             </a:fld>
             <a:endParaRPr lang="en-US"/>
           </a:p>
@@ -3074,7 +3074,7 @@
           <a:p>
             <a:fld id="{78C97017-6FC3-485B-9764-EAC9E56C1D49}" type="datetimeFigureOut">
               <a:rPr lang="en-US" smtClean="0"/>
-              <a:t>11/3/2016</a:t>
+              <a:t>11/6/2016</a:t>
             </a:fld>
             <a:endParaRPr lang="en-US"/>
           </a:p>
@@ -5595,7 +5595,7 @@
           <a:p>
             <a:r>
               <a:rPr lang="en-US" sz="1400" dirty="0"/>
-              <a:t>delete task 1</a:t>
+              <a:t>delete /t 1</a:t>
             </a:r>
           </a:p>
         </p:txBody>
@@ -5664,7 +5664,7 @@
                   <a:srgbClr val="0070C0"/>
                 </a:solidFill>
               </a:rPr>
-              <a:t>execute(“delete task 1”)</a:t>
+              <a:t>execute(“delete /t 1”)</a:t>
             </a:r>
           </a:p>
         </p:txBody>
@@ -15230,7 +15230,7 @@
         <p:spPr>
           <a:xfrm>
             <a:off x="7712397" y="2429446"/>
-            <a:ext cx="822003" cy="228600"/>
+            <a:ext cx="974403" cy="237554"/>
           </a:xfrm>
           <a:prstGeom prst="rect">
             <a:avLst/>
@@ -15286,7 +15286,7 @@
         <p:spPr>
           <a:xfrm>
             <a:off x="7712396" y="2810446"/>
-            <a:ext cx="822003" cy="237554"/>
+            <a:ext cx="974404" cy="237554"/>
           </a:xfrm>
           <a:prstGeom prst="rect">
             <a:avLst/>
@@ -15383,7 +15383,7 @@
         <p:spPr>
           <a:xfrm>
             <a:off x="7712396" y="3276600"/>
-            <a:ext cx="822003" cy="237554"/>
+            <a:ext cx="974404" cy="228600"/>
           </a:xfrm>
           <a:prstGeom prst="rect">
             <a:avLst/>
@@ -15415,12 +15415,12 @@
           <a:p>
             <a:pPr algn="ctr"/>
             <a:r>
-              <a:rPr lang="en-US" sz="1050" dirty="0">
+              <a:rPr lang="en-US" sz="1050" dirty="0" err="1">
                 <a:solidFill>
                   <a:srgbClr val="7030A0"/>
                 </a:solidFill>
               </a:rPr>
-              <a:t>Duration</a:t>
+              <a:t>EventDuration</a:t>
             </a:r>
             <a:endParaRPr lang="en-SG" sz="1050" dirty="0">
               <a:solidFill>
@@ -15441,8 +15441,8 @@
         </p:nvCxnSpPr>
         <p:spPr>
           <a:xfrm rot="16200000" flipH="1">
-            <a:off x="7299285" y="2982266"/>
-            <a:ext cx="273796" cy="552425"/>
+            <a:off x="7301524" y="2980027"/>
+            <a:ext cx="269319" cy="552425"/>
           </a:xfrm>
           <a:prstGeom prst="bentConnector2">
             <a:avLst/>
@@ -16089,12 +16089,12 @@
         </p:nvCxnSpPr>
         <p:spPr>
           <a:xfrm flipV="1">
-            <a:off x="7277995" y="2543746"/>
-            <a:ext cx="434402" cy="491145"/>
+            <a:off x="7277995" y="2548223"/>
+            <a:ext cx="434402" cy="486668"/>
           </a:xfrm>
           <a:prstGeom prst="bentConnector3">
             <a:avLst>
-              <a:gd name="adj1" fmla="val 45790"/>
+              <a:gd name="adj1" fmla="val 50000"/>
             </a:avLst>
           </a:prstGeom>
           <a:ln w="19050">
@@ -16130,7 +16130,7 @@
         <p:spPr>
           <a:xfrm>
             <a:off x="7696200" y="1905000"/>
-            <a:ext cx="822003" cy="228600"/>
+            <a:ext cx="990600" cy="228600"/>
           </a:xfrm>
           <a:prstGeom prst="rect">
             <a:avLst/>

</xml_diff>